<commit_message>
add patch and dist
</commit_message>
<xml_diff>
--- a/doc/Report/ongoing.pptx
+++ b/doc/Report/ongoing.pptx
@@ -5,17 +5,20 @@
     <p:sldMasterId id="2147483648" r:id="rId1"/>
   </p:sldMasterIdLst>
   <p:notesMasterIdLst>
-    <p:notesMasterId r:id="rId10"/>
+    <p:notesMasterId r:id="rId13"/>
   </p:notesMasterIdLst>
   <p:sldIdLst>
     <p:sldId id="271" r:id="rId2"/>
     <p:sldId id="295" r:id="rId3"/>
-    <p:sldId id="296" r:id="rId4"/>
-    <p:sldId id="302" r:id="rId5"/>
-    <p:sldId id="306" r:id="rId6"/>
-    <p:sldId id="307" r:id="rId7"/>
-    <p:sldId id="304" r:id="rId8"/>
-    <p:sldId id="305" r:id="rId9"/>
+    <p:sldId id="308" r:id="rId4"/>
+    <p:sldId id="296" r:id="rId5"/>
+    <p:sldId id="302" r:id="rId6"/>
+    <p:sldId id="309" r:id="rId7"/>
+    <p:sldId id="306" r:id="rId8"/>
+    <p:sldId id="307" r:id="rId9"/>
+    <p:sldId id="310" r:id="rId10"/>
+    <p:sldId id="304" r:id="rId11"/>
+    <p:sldId id="305" r:id="rId12"/>
   </p:sldIdLst>
   <p:sldSz cx="12192000" cy="6858000"/>
   <p:notesSz cx="6858000" cy="9144000"/>
@@ -204,7 +207,7 @@
           <a:p>
             <a:fld id="{97BE2177-E45B-449F-AE2E-ED4743253C6D}" type="datetimeFigureOut">
               <a:rPr lang="zh-CN" altLang="en-US" smtClean="0"/>
-              <a:t>2018/9/3</a:t>
+              <a:t>2018/9/5</a:t>
             </a:fld>
             <a:endParaRPr lang="zh-CN" altLang="en-US"/>
           </a:p>
@@ -536,7 +539,7 @@
           <a:p>
             <a:fld id="{C676D08B-1E4C-4901-ABEC-209650D3181D}" type="slidenum">
               <a:rPr lang="zh-CN" altLang="en-US" smtClean="0"/>
-              <a:t>5</a:t>
+              <a:t>3</a:t>
             </a:fld>
             <a:endParaRPr lang="zh-CN" altLang="en-US"/>
           </a:p>
@@ -545,7 +548,7 @@
     </p:spTree>
     <p:extLst>
       <p:ext uri="{BB962C8B-B14F-4D97-AF65-F5344CB8AC3E}">
-        <p14:creationId xmlns:p14="http://schemas.microsoft.com/office/powerpoint/2010/main" val="2768591612"/>
+        <p14:creationId xmlns:p14="http://schemas.microsoft.com/office/powerpoint/2010/main" val="2823439655"/>
       </p:ext>
     </p:extLst>
   </p:cSld>
@@ -629,7 +632,259 @@
     </p:spTree>
     <p:extLst>
       <p:ext uri="{BB962C8B-B14F-4D97-AF65-F5344CB8AC3E}">
+        <p14:creationId xmlns:p14="http://schemas.microsoft.com/office/powerpoint/2010/main" val="1152025013"/>
+      </p:ext>
+    </p:extLst>
+  </p:cSld>
+  <p:clrMapOvr>
+    <a:masterClrMapping/>
+  </p:clrMapOvr>
+</p:notes>
+</file>
+
+<file path=ppt/notesSlides/notesSlide3.xml><?xml version="1.0" encoding="utf-8"?>
+<p:notes xmlns:a="http://schemas.openxmlformats.org/drawingml/2006/main" xmlns:r="http://schemas.openxmlformats.org/officeDocument/2006/relationships" xmlns:p="http://schemas.openxmlformats.org/presentationml/2006/main">
+  <p:cSld>
+    <p:spTree>
+      <p:nvGrpSpPr>
+        <p:cNvPr id="1" name=""/>
+        <p:cNvGrpSpPr/>
+        <p:nvPr/>
+      </p:nvGrpSpPr>
+      <p:grpSpPr>
+        <a:xfrm>
+          <a:off x="0" y="0"/>
+          <a:ext cx="0" cy="0"/>
+          <a:chOff x="0" y="0"/>
+          <a:chExt cx="0" cy="0"/>
+        </a:xfrm>
+      </p:grpSpPr>
+      <p:sp>
+        <p:nvSpPr>
+          <p:cNvPr id="2" name="幻灯片图像占位符 1"/>
+          <p:cNvSpPr>
+            <a:spLocks noGrp="1" noRot="1" noChangeAspect="1"/>
+          </p:cNvSpPr>
+          <p:nvPr>
+            <p:ph type="sldImg"/>
+          </p:nvPr>
+        </p:nvSpPr>
+        <p:spPr/>
+      </p:sp>
+      <p:sp>
+        <p:nvSpPr>
+          <p:cNvPr id="3" name="备注占位符 2"/>
+          <p:cNvSpPr>
+            <a:spLocks noGrp="1"/>
+          </p:cNvSpPr>
+          <p:nvPr>
+            <p:ph type="body" idx="1"/>
+          </p:nvPr>
+        </p:nvSpPr>
+        <p:spPr/>
+        <p:txBody>
+          <a:bodyPr/>
+          <a:lstStyle/>
+          <a:p>
+            <a:endParaRPr lang="zh-CN" altLang="en-US" dirty="0"/>
+          </a:p>
+        </p:txBody>
+      </p:sp>
+      <p:sp>
+        <p:nvSpPr>
+          <p:cNvPr id="4" name="灯片编号占位符 3"/>
+          <p:cNvSpPr>
+            <a:spLocks noGrp="1"/>
+          </p:cNvSpPr>
+          <p:nvPr>
+            <p:ph type="sldNum" sz="quarter" idx="10"/>
+          </p:nvPr>
+        </p:nvSpPr>
+        <p:spPr/>
+        <p:txBody>
+          <a:bodyPr/>
+          <a:lstStyle/>
+          <a:p>
+            <a:fld id="{C676D08B-1E4C-4901-ABEC-209650D3181D}" type="slidenum">
+              <a:rPr lang="zh-CN" altLang="en-US" smtClean="0"/>
+              <a:t>7</a:t>
+            </a:fld>
+            <a:endParaRPr lang="zh-CN" altLang="en-US"/>
+          </a:p>
+        </p:txBody>
+      </p:sp>
+    </p:spTree>
+    <p:extLst>
+      <p:ext uri="{BB962C8B-B14F-4D97-AF65-F5344CB8AC3E}">
+        <p14:creationId xmlns:p14="http://schemas.microsoft.com/office/powerpoint/2010/main" val="2768591612"/>
+      </p:ext>
+    </p:extLst>
+  </p:cSld>
+  <p:clrMapOvr>
+    <a:masterClrMapping/>
+  </p:clrMapOvr>
+</p:notes>
+</file>
+
+<file path=ppt/notesSlides/notesSlide4.xml><?xml version="1.0" encoding="utf-8"?>
+<p:notes xmlns:a="http://schemas.openxmlformats.org/drawingml/2006/main" xmlns:r="http://schemas.openxmlformats.org/officeDocument/2006/relationships" xmlns:p="http://schemas.openxmlformats.org/presentationml/2006/main">
+  <p:cSld>
+    <p:spTree>
+      <p:nvGrpSpPr>
+        <p:cNvPr id="1" name=""/>
+        <p:cNvGrpSpPr/>
+        <p:nvPr/>
+      </p:nvGrpSpPr>
+      <p:grpSpPr>
+        <a:xfrm>
+          <a:off x="0" y="0"/>
+          <a:ext cx="0" cy="0"/>
+          <a:chOff x="0" y="0"/>
+          <a:chExt cx="0" cy="0"/>
+        </a:xfrm>
+      </p:grpSpPr>
+      <p:sp>
+        <p:nvSpPr>
+          <p:cNvPr id="2" name="幻灯片图像占位符 1"/>
+          <p:cNvSpPr>
+            <a:spLocks noGrp="1" noRot="1" noChangeAspect="1"/>
+          </p:cNvSpPr>
+          <p:nvPr>
+            <p:ph type="sldImg"/>
+          </p:nvPr>
+        </p:nvSpPr>
+        <p:spPr/>
+      </p:sp>
+      <p:sp>
+        <p:nvSpPr>
+          <p:cNvPr id="3" name="备注占位符 2"/>
+          <p:cNvSpPr>
+            <a:spLocks noGrp="1"/>
+          </p:cNvSpPr>
+          <p:nvPr>
+            <p:ph type="body" idx="1"/>
+          </p:nvPr>
+        </p:nvSpPr>
+        <p:spPr/>
+        <p:txBody>
+          <a:bodyPr/>
+          <a:lstStyle/>
+          <a:p>
+            <a:endParaRPr lang="zh-CN" altLang="en-US" dirty="0"/>
+          </a:p>
+        </p:txBody>
+      </p:sp>
+      <p:sp>
+        <p:nvSpPr>
+          <p:cNvPr id="4" name="灯片编号占位符 3"/>
+          <p:cNvSpPr>
+            <a:spLocks noGrp="1"/>
+          </p:cNvSpPr>
+          <p:nvPr>
+            <p:ph type="sldNum" sz="quarter" idx="10"/>
+          </p:nvPr>
+        </p:nvSpPr>
+        <p:spPr/>
+        <p:txBody>
+          <a:bodyPr/>
+          <a:lstStyle/>
+          <a:p>
+            <a:fld id="{C676D08B-1E4C-4901-ABEC-209650D3181D}" type="slidenum">
+              <a:rPr lang="zh-CN" altLang="en-US" smtClean="0"/>
+              <a:t>8</a:t>
+            </a:fld>
+            <a:endParaRPr lang="zh-CN" altLang="en-US"/>
+          </a:p>
+        </p:txBody>
+      </p:sp>
+    </p:spTree>
+    <p:extLst>
+      <p:ext uri="{BB962C8B-B14F-4D97-AF65-F5344CB8AC3E}">
         <p14:creationId xmlns:p14="http://schemas.microsoft.com/office/powerpoint/2010/main" val="1859630201"/>
+      </p:ext>
+    </p:extLst>
+  </p:cSld>
+  <p:clrMapOvr>
+    <a:masterClrMapping/>
+  </p:clrMapOvr>
+</p:notes>
+</file>
+
+<file path=ppt/notesSlides/notesSlide5.xml><?xml version="1.0" encoding="utf-8"?>
+<p:notes xmlns:a="http://schemas.openxmlformats.org/drawingml/2006/main" xmlns:r="http://schemas.openxmlformats.org/officeDocument/2006/relationships" xmlns:p="http://schemas.openxmlformats.org/presentationml/2006/main">
+  <p:cSld>
+    <p:spTree>
+      <p:nvGrpSpPr>
+        <p:cNvPr id="1" name=""/>
+        <p:cNvGrpSpPr/>
+        <p:nvPr/>
+      </p:nvGrpSpPr>
+      <p:grpSpPr>
+        <a:xfrm>
+          <a:off x="0" y="0"/>
+          <a:ext cx="0" cy="0"/>
+          <a:chOff x="0" y="0"/>
+          <a:chExt cx="0" cy="0"/>
+        </a:xfrm>
+      </p:grpSpPr>
+      <p:sp>
+        <p:nvSpPr>
+          <p:cNvPr id="2" name="幻灯片图像占位符 1"/>
+          <p:cNvSpPr>
+            <a:spLocks noGrp="1" noRot="1" noChangeAspect="1"/>
+          </p:cNvSpPr>
+          <p:nvPr>
+            <p:ph type="sldImg"/>
+          </p:nvPr>
+        </p:nvSpPr>
+        <p:spPr/>
+      </p:sp>
+      <p:sp>
+        <p:nvSpPr>
+          <p:cNvPr id="3" name="备注占位符 2"/>
+          <p:cNvSpPr>
+            <a:spLocks noGrp="1"/>
+          </p:cNvSpPr>
+          <p:nvPr>
+            <p:ph type="body" idx="1"/>
+          </p:nvPr>
+        </p:nvSpPr>
+        <p:spPr/>
+        <p:txBody>
+          <a:bodyPr/>
+          <a:lstStyle/>
+          <a:p>
+            <a:endParaRPr lang="zh-CN" altLang="en-US" dirty="0"/>
+          </a:p>
+        </p:txBody>
+      </p:sp>
+      <p:sp>
+        <p:nvSpPr>
+          <p:cNvPr id="4" name="灯片编号占位符 3"/>
+          <p:cNvSpPr>
+            <a:spLocks noGrp="1"/>
+          </p:cNvSpPr>
+          <p:nvPr>
+            <p:ph type="sldNum" sz="quarter" idx="10"/>
+          </p:nvPr>
+        </p:nvSpPr>
+        <p:spPr/>
+        <p:txBody>
+          <a:bodyPr/>
+          <a:lstStyle/>
+          <a:p>
+            <a:fld id="{C676D08B-1E4C-4901-ABEC-209650D3181D}" type="slidenum">
+              <a:rPr lang="zh-CN" altLang="en-US" smtClean="0"/>
+              <a:t>9</a:t>
+            </a:fld>
+            <a:endParaRPr lang="zh-CN" altLang="en-US"/>
+          </a:p>
+        </p:txBody>
+      </p:sp>
+    </p:spTree>
+    <p:extLst>
+      <p:ext uri="{BB962C8B-B14F-4D97-AF65-F5344CB8AC3E}">
+        <p14:creationId xmlns:p14="http://schemas.microsoft.com/office/powerpoint/2010/main" val="308378821"/>
       </p:ext>
     </p:extLst>
   </p:cSld>
@@ -786,7 +1041,7 @@
           <a:p>
             <a:fld id="{B9614994-C529-43AC-BD2C-52D47B0301A5}" type="datetimeFigureOut">
               <a:rPr lang="zh-CN" altLang="en-US" smtClean="0"/>
-              <a:t>2018/9/2</a:t>
+              <a:t>2018/9/5</a:t>
             </a:fld>
             <a:endParaRPr lang="zh-CN" altLang="en-US"/>
           </a:p>
@@ -984,7 +1239,7 @@
           <a:p>
             <a:fld id="{B9614994-C529-43AC-BD2C-52D47B0301A5}" type="datetimeFigureOut">
               <a:rPr lang="zh-CN" altLang="en-US" smtClean="0"/>
-              <a:t>2018/9/2</a:t>
+              <a:t>2018/9/5</a:t>
             </a:fld>
             <a:endParaRPr lang="zh-CN" altLang="en-US"/>
           </a:p>
@@ -1192,7 +1447,7 @@
           <a:p>
             <a:fld id="{B9614994-C529-43AC-BD2C-52D47B0301A5}" type="datetimeFigureOut">
               <a:rPr lang="zh-CN" altLang="en-US" smtClean="0"/>
-              <a:t>2018/9/2</a:t>
+              <a:t>2018/9/5</a:t>
             </a:fld>
             <a:endParaRPr lang="zh-CN" altLang="en-US"/>
           </a:p>
@@ -1390,7 +1645,7 @@
           <a:p>
             <a:fld id="{B9614994-C529-43AC-BD2C-52D47B0301A5}" type="datetimeFigureOut">
               <a:rPr lang="zh-CN" altLang="en-US" smtClean="0"/>
-              <a:t>2018/9/2</a:t>
+              <a:t>2018/9/5</a:t>
             </a:fld>
             <a:endParaRPr lang="zh-CN" altLang="en-US"/>
           </a:p>
@@ -1665,7 +1920,7 @@
           <a:p>
             <a:fld id="{B9614994-C529-43AC-BD2C-52D47B0301A5}" type="datetimeFigureOut">
               <a:rPr lang="zh-CN" altLang="en-US" smtClean="0"/>
-              <a:t>2018/9/2</a:t>
+              <a:t>2018/9/5</a:t>
             </a:fld>
             <a:endParaRPr lang="zh-CN" altLang="en-US"/>
           </a:p>
@@ -1930,7 +2185,7 @@
           <a:p>
             <a:fld id="{B9614994-C529-43AC-BD2C-52D47B0301A5}" type="datetimeFigureOut">
               <a:rPr lang="zh-CN" altLang="en-US" smtClean="0"/>
-              <a:t>2018/9/2</a:t>
+              <a:t>2018/9/5</a:t>
             </a:fld>
             <a:endParaRPr lang="zh-CN" altLang="en-US"/>
           </a:p>
@@ -2342,7 +2597,7 @@
           <a:p>
             <a:fld id="{B9614994-C529-43AC-BD2C-52D47B0301A5}" type="datetimeFigureOut">
               <a:rPr lang="zh-CN" altLang="en-US" smtClean="0"/>
-              <a:t>2018/9/2</a:t>
+              <a:t>2018/9/5</a:t>
             </a:fld>
             <a:endParaRPr lang="zh-CN" altLang="en-US"/>
           </a:p>
@@ -2483,7 +2738,7 @@
           <a:p>
             <a:fld id="{B9614994-C529-43AC-BD2C-52D47B0301A5}" type="datetimeFigureOut">
               <a:rPr lang="zh-CN" altLang="en-US" smtClean="0"/>
-              <a:t>2018/9/2</a:t>
+              <a:t>2018/9/5</a:t>
             </a:fld>
             <a:endParaRPr lang="zh-CN" altLang="en-US"/>
           </a:p>
@@ -2596,7 +2851,7 @@
           <a:p>
             <a:fld id="{B9614994-C529-43AC-BD2C-52D47B0301A5}" type="datetimeFigureOut">
               <a:rPr lang="zh-CN" altLang="en-US" smtClean="0"/>
-              <a:t>2018/9/2</a:t>
+              <a:t>2018/9/5</a:t>
             </a:fld>
             <a:endParaRPr lang="zh-CN" altLang="en-US"/>
           </a:p>
@@ -2907,7 +3162,7 @@
           <a:p>
             <a:fld id="{B9614994-C529-43AC-BD2C-52D47B0301A5}" type="datetimeFigureOut">
               <a:rPr lang="zh-CN" altLang="en-US" smtClean="0"/>
-              <a:t>2018/9/2</a:t>
+              <a:t>2018/9/5</a:t>
             </a:fld>
             <a:endParaRPr lang="zh-CN" altLang="en-US"/>
           </a:p>
@@ -3195,7 +3450,7 @@
           <a:p>
             <a:fld id="{B9614994-C529-43AC-BD2C-52D47B0301A5}" type="datetimeFigureOut">
               <a:rPr lang="zh-CN" altLang="en-US" smtClean="0"/>
-              <a:t>2018/9/2</a:t>
+              <a:t>2018/9/5</a:t>
             </a:fld>
             <a:endParaRPr lang="zh-CN" altLang="en-US"/>
           </a:p>
@@ -3436,7 +3691,7 @@
           <a:p>
             <a:fld id="{B9614994-C529-43AC-BD2C-52D47B0301A5}" type="datetimeFigureOut">
               <a:rPr lang="zh-CN" altLang="en-US" smtClean="0"/>
-              <a:t>2018/9/2</a:t>
+              <a:t>2018/9/5</a:t>
             </a:fld>
             <a:endParaRPr lang="zh-CN" altLang="en-US"/>
           </a:p>
@@ -3945,20 +4200,12 @@
           </a:p>
           <a:p>
             <a:r>
-              <a:rPr lang="en-US" sz="2000">
-                <a:latin typeface="Calibri" charset="0"/>
-                <a:ea typeface="Calibri" charset="0"/>
-                <a:cs typeface="Calibri" charset="0"/>
-              </a:rPr>
-              <a:t>Aug </a:t>
-            </a:r>
-            <a:r>
               <a:rPr lang="en-US" sz="2000" dirty="0">
                 <a:latin typeface="Calibri" charset="0"/>
                 <a:ea typeface="Calibri" charset="0"/>
                 <a:cs typeface="Calibri" charset="0"/>
               </a:rPr>
-              <a:t>28, 2018</a:t>
+              <a:t>Aug 28, 2018</a:t>
             </a:r>
           </a:p>
         </p:txBody>
@@ -4006,6 +4253,282 @@
 </p:sld>
 </file>
 
+<file path=ppt/slides/slide10.xml><?xml version="1.0" encoding="utf-8"?>
+<p:sld xmlns:a="http://schemas.openxmlformats.org/drawingml/2006/main" xmlns:r="http://schemas.openxmlformats.org/officeDocument/2006/relationships" xmlns:p="http://schemas.openxmlformats.org/presentationml/2006/main">
+  <p:cSld>
+    <p:spTree>
+      <p:nvGrpSpPr>
+        <p:cNvPr id="1" name=""/>
+        <p:cNvGrpSpPr/>
+        <p:nvPr/>
+      </p:nvGrpSpPr>
+      <p:grpSpPr>
+        <a:xfrm>
+          <a:off x="0" y="0"/>
+          <a:ext cx="0" cy="0"/>
+          <a:chOff x="0" y="0"/>
+          <a:chExt cx="0" cy="0"/>
+        </a:xfrm>
+      </p:grpSpPr>
+      <p:sp>
+        <p:nvSpPr>
+          <p:cNvPr id="2" name="标题 1">
+            <a:extLst>
+              <a:ext uri="{FF2B5EF4-FFF2-40B4-BE49-F238E27FC236}">
+                <a16:creationId xmlns:a16="http://schemas.microsoft.com/office/drawing/2014/main" id="{7E4CFA14-E8C9-4F79-B31E-7AC8C0F7ADF4}"/>
+              </a:ext>
+            </a:extLst>
+          </p:cNvPr>
+          <p:cNvSpPr>
+            <a:spLocks noGrp="1"/>
+          </p:cNvSpPr>
+          <p:nvPr>
+            <p:ph type="title"/>
+          </p:nvPr>
+        </p:nvSpPr>
+        <p:spPr>
+          <a:xfrm>
+            <a:off x="838200" y="681037"/>
+            <a:ext cx="10515600" cy="1325563"/>
+          </a:xfrm>
+        </p:spPr>
+        <p:txBody>
+          <a:bodyPr>
+            <a:normAutofit fontScale="90000"/>
+          </a:bodyPr>
+          <a:lstStyle/>
+          <a:p>
+            <a:r>
+              <a:rPr lang="en-US" altLang="zh-CN" dirty="0"/>
+              <a:t>Distributed Compression</a:t>
+            </a:r>
+            <a:br>
+              <a:rPr lang="en-US" altLang="zh-CN" dirty="0"/>
+            </a:br>
+            <a:br>
+              <a:rPr lang="en-US" altLang="zh-CN" dirty="0"/>
+            </a:br>
+            <a:endParaRPr lang="zh-CN" altLang="en-US" dirty="0"/>
+          </a:p>
+        </p:txBody>
+      </p:sp>
+      <p:sp>
+        <p:nvSpPr>
+          <p:cNvPr id="3" name="内容占位符 2">
+            <a:extLst>
+              <a:ext uri="{FF2B5EF4-FFF2-40B4-BE49-F238E27FC236}">
+                <a16:creationId xmlns:a16="http://schemas.microsoft.com/office/drawing/2014/main" id="{65B773BF-8D7E-447B-99B4-F29841BEF59C}"/>
+              </a:ext>
+            </a:extLst>
+          </p:cNvPr>
+          <p:cNvSpPr>
+            <a:spLocks noGrp="1"/>
+          </p:cNvSpPr>
+          <p:nvPr>
+            <p:ph idx="1"/>
+          </p:nvPr>
+        </p:nvSpPr>
+        <p:spPr/>
+        <p:txBody>
+          <a:bodyPr/>
+          <a:lstStyle/>
+          <a:p>
+            <a:r>
+              <a:rPr lang="en-US" altLang="zh-CN" dirty="0"/>
+              <a:t>Milestones</a:t>
+            </a:r>
+          </a:p>
+          <a:p>
+            <a:pPr lvl="1"/>
+            <a:r>
+              <a:rPr lang="en-US" altLang="zh-CN" dirty="0"/>
+              <a:t>Split image dataset into several subset of data</a:t>
+            </a:r>
+          </a:p>
+          <a:p>
+            <a:pPr lvl="1"/>
+            <a:r>
+              <a:rPr lang="en-US" altLang="zh-CN" dirty="0"/>
+              <a:t>Each slave node has a sperate encoder</a:t>
+            </a:r>
+          </a:p>
+          <a:p>
+            <a:pPr lvl="1"/>
+            <a:r>
+              <a:rPr lang="en-US" altLang="zh-CN" dirty="0"/>
+              <a:t>The main host receive the codes from slave nodes and concatenate them together to decode them from a single decoder</a:t>
+            </a:r>
+          </a:p>
+          <a:p>
+            <a:pPr lvl="1"/>
+            <a:r>
+              <a:rPr lang="en-US" altLang="zh-CN" dirty="0"/>
+              <a:t>The system should yield better rate-distortion curve compared to decode each slave node separately</a:t>
+            </a:r>
+          </a:p>
+          <a:p>
+            <a:pPr lvl="1"/>
+            <a:r>
+              <a:rPr lang="en-US" altLang="zh-CN" dirty="0"/>
+              <a:t>Possible to add classification and other objectives</a:t>
+            </a:r>
+          </a:p>
+        </p:txBody>
+      </p:sp>
+    </p:spTree>
+    <p:extLst>
+      <p:ext uri="{BB962C8B-B14F-4D97-AF65-F5344CB8AC3E}">
+        <p14:creationId xmlns:p14="http://schemas.microsoft.com/office/powerpoint/2010/main" val="1769019586"/>
+      </p:ext>
+    </p:extLst>
+  </p:cSld>
+  <p:clrMapOvr>
+    <a:masterClrMapping/>
+  </p:clrMapOvr>
+</p:sld>
+</file>
+
+<file path=ppt/slides/slide11.xml><?xml version="1.0" encoding="utf-8"?>
+<p:sld xmlns:a="http://schemas.openxmlformats.org/drawingml/2006/main" xmlns:r="http://schemas.openxmlformats.org/officeDocument/2006/relationships" xmlns:p="http://schemas.openxmlformats.org/presentationml/2006/main">
+  <p:cSld>
+    <p:spTree>
+      <p:nvGrpSpPr>
+        <p:cNvPr id="1" name=""/>
+        <p:cNvGrpSpPr/>
+        <p:nvPr/>
+      </p:nvGrpSpPr>
+      <p:grpSpPr>
+        <a:xfrm>
+          <a:off x="0" y="0"/>
+          <a:ext cx="0" cy="0"/>
+          <a:chOff x="0" y="0"/>
+          <a:chExt cx="0" cy="0"/>
+        </a:xfrm>
+      </p:grpSpPr>
+      <p:sp>
+        <p:nvSpPr>
+          <p:cNvPr id="2" name="标题 1">
+            <a:extLst>
+              <a:ext uri="{FF2B5EF4-FFF2-40B4-BE49-F238E27FC236}">
+                <a16:creationId xmlns:a16="http://schemas.microsoft.com/office/drawing/2014/main" id="{7E4CFA14-E8C9-4F79-B31E-7AC8C0F7ADF4}"/>
+              </a:ext>
+            </a:extLst>
+          </p:cNvPr>
+          <p:cNvSpPr>
+            <a:spLocks noGrp="1"/>
+          </p:cNvSpPr>
+          <p:nvPr>
+            <p:ph type="title"/>
+          </p:nvPr>
+        </p:nvSpPr>
+        <p:spPr>
+          <a:xfrm>
+            <a:off x="838200" y="681037"/>
+            <a:ext cx="10515600" cy="1325563"/>
+          </a:xfrm>
+        </p:spPr>
+        <p:txBody>
+          <a:bodyPr>
+            <a:normAutofit fontScale="90000"/>
+          </a:bodyPr>
+          <a:lstStyle/>
+          <a:p>
+            <a:r>
+              <a:rPr lang="en-US" altLang="zh-CN" dirty="0"/>
+              <a:t>Codec Conversion</a:t>
+            </a:r>
+            <a:br>
+              <a:rPr lang="en-US" altLang="zh-CN" dirty="0"/>
+            </a:br>
+            <a:br>
+              <a:rPr lang="en-US" altLang="zh-CN" dirty="0"/>
+            </a:br>
+            <a:endParaRPr lang="zh-CN" altLang="en-US" dirty="0"/>
+          </a:p>
+        </p:txBody>
+      </p:sp>
+      <p:sp>
+        <p:nvSpPr>
+          <p:cNvPr id="3" name="内容占位符 2">
+            <a:extLst>
+              <a:ext uri="{FF2B5EF4-FFF2-40B4-BE49-F238E27FC236}">
+                <a16:creationId xmlns:a16="http://schemas.microsoft.com/office/drawing/2014/main" id="{65B773BF-8D7E-447B-99B4-F29841BEF59C}"/>
+              </a:ext>
+            </a:extLst>
+          </p:cNvPr>
+          <p:cNvSpPr>
+            <a:spLocks noGrp="1"/>
+          </p:cNvSpPr>
+          <p:nvPr>
+            <p:ph idx="1"/>
+          </p:nvPr>
+        </p:nvSpPr>
+        <p:spPr/>
+        <p:txBody>
+          <a:bodyPr/>
+          <a:lstStyle/>
+          <a:p>
+            <a:r>
+              <a:rPr lang="en-US" altLang="zh-CN" dirty="0"/>
+              <a:t>Milestones</a:t>
+            </a:r>
+          </a:p>
+          <a:p>
+            <a:r>
+              <a:rPr lang="en-US" altLang="zh-CN" dirty="0"/>
+              <a:t>Convert between classical codecs like jpeg, </a:t>
+            </a:r>
+            <a:r>
+              <a:rPr lang="en-US" altLang="zh-CN" dirty="0" err="1"/>
+              <a:t>png</a:t>
+            </a:r>
+            <a:r>
+              <a:rPr lang="en-US" altLang="zh-CN" dirty="0"/>
+              <a:t> and neural network based codecs</a:t>
+            </a:r>
+          </a:p>
+          <a:p>
+            <a:pPr lvl="1"/>
+            <a:r>
+              <a:rPr lang="en-US" altLang="zh-CN" dirty="0"/>
+              <a:t>Convert between neural network based codecs</a:t>
+            </a:r>
+          </a:p>
+          <a:p>
+            <a:pPr lvl="1"/>
+            <a:r>
+              <a:rPr lang="en-US" altLang="zh-CN" dirty="0"/>
+              <a:t>Convert between classical codecs</a:t>
+            </a:r>
+          </a:p>
+          <a:p>
+            <a:pPr lvl="1"/>
+            <a:r>
+              <a:rPr lang="en-US" altLang="zh-CN" dirty="0"/>
+              <a:t>Can we convert between lossy compressed codes and lossless compressed codes with neural network</a:t>
+            </a:r>
+          </a:p>
+          <a:p>
+            <a:pPr marL="457200" lvl="1" indent="0">
+              <a:buNone/>
+            </a:pPr>
+            <a:endParaRPr lang="en-US" altLang="zh-CN" dirty="0"/>
+          </a:p>
+        </p:txBody>
+      </p:sp>
+    </p:spTree>
+    <p:extLst>
+      <p:ext uri="{BB962C8B-B14F-4D97-AF65-F5344CB8AC3E}">
+        <p14:creationId xmlns:p14="http://schemas.microsoft.com/office/powerpoint/2010/main" val="2260779395"/>
+      </p:ext>
+    </p:extLst>
+  </p:cSld>
+  <p:clrMapOvr>
+    <a:masterClrMapping/>
+  </p:clrMapOvr>
+</p:sld>
+</file>
+
 <file path=ppt/slides/slide2.xml><?xml version="1.0" encoding="utf-8"?>
 <p:sld xmlns:a="http://schemas.openxmlformats.org/drawingml/2006/main" xmlns:r="http://schemas.openxmlformats.org/officeDocument/2006/relationships" xmlns:p="http://schemas.openxmlformats.org/presentationml/2006/main">
   <p:cSld>
@@ -4070,8 +4593,22 @@
         </p:nvSpPr>
         <p:spPr/>
         <p:txBody>
-          <a:bodyPr/>
-          <a:lstStyle/>
+          <a:bodyPr>
+            <a:normAutofit/>
+          </a:bodyPr>
+          <a:lstStyle/>
+          <a:p>
+            <a:r>
+              <a:rPr lang="en-US" altLang="zh-CN" dirty="0"/>
+              <a:t>Computation</a:t>
+            </a:r>
+          </a:p>
+          <a:p>
+            <a:r>
+              <a:rPr lang="en-US" altLang="zh-CN" dirty="0"/>
+              <a:t>Data</a:t>
+            </a:r>
+          </a:p>
           <a:p>
             <a:r>
               <a:rPr lang="en-US" altLang="zh-CN" dirty="0"/>
@@ -4082,42 +4619,21 @@
             <a:pPr lvl="1"/>
             <a:r>
               <a:rPr lang="en-US" altLang="zh-CN" dirty="0"/>
-              <a:t>Data</a:t>
+              <a:t>Rate Variable Classification</a:t>
             </a:r>
           </a:p>
           <a:p>
             <a:pPr lvl="1"/>
             <a:r>
               <a:rPr lang="en-US" altLang="zh-CN" dirty="0"/>
-              <a:t>Compression</a:t>
+              <a:t>Two stage (isolated) optimization</a:t>
             </a:r>
           </a:p>
           <a:p>
             <a:pPr lvl="1"/>
             <a:r>
               <a:rPr lang="en-US" altLang="zh-CN" dirty="0"/>
-              <a:t>Classification</a:t>
-            </a:r>
-          </a:p>
-          <a:p>
-            <a:pPr lvl="1"/>
-            <a:r>
-              <a:rPr lang="en-US" altLang="zh-CN" dirty="0"/>
-              <a:t>Multi-Objective Optimization</a:t>
-            </a:r>
-          </a:p>
-          <a:p>
-            <a:pPr lvl="1"/>
-            <a:r>
-              <a:rPr lang="en-US" altLang="zh-CN" dirty="0"/>
-              <a:t>Preliminary Result</a:t>
-            </a:r>
-          </a:p>
-          <a:p>
-            <a:pPr lvl="1"/>
-            <a:r>
-              <a:rPr lang="en-US" altLang="zh-CN" dirty="0"/>
-              <a:t>Next Step</a:t>
+              <a:t>CIFAR10</a:t>
             </a:r>
           </a:p>
           <a:p>
@@ -4173,7 +4689,7 @@
           <p:cNvPr id="2" name="标题 1">
             <a:extLst>
               <a:ext uri="{FF2B5EF4-FFF2-40B4-BE49-F238E27FC236}">
-                <a16:creationId xmlns:a16="http://schemas.microsoft.com/office/drawing/2014/main" id="{7E4CFA14-E8C9-4F79-B31E-7AC8C0F7ADF4}"/>
+                <a16:creationId xmlns:a16="http://schemas.microsoft.com/office/drawing/2014/main" id="{79CF7ED7-445B-4732-928D-97004C11D38B}"/>
               </a:ext>
             </a:extLst>
           </p:cNvPr>
@@ -4191,11 +4707,8 @@
           <a:p>
             <a:r>
               <a:rPr lang="en-US" altLang="zh-CN" dirty="0"/>
-              <a:t>Compression and Classification</a:t>
-            </a:r>
-            <a:br>
-              <a:rPr lang="en-US" altLang="zh-CN" dirty="0"/>
-            </a:br>
+              <a:t>Computation</a:t>
+            </a:r>
             <a:endParaRPr lang="zh-CN" altLang="en-US" dirty="0"/>
           </a:p>
         </p:txBody>
@@ -4205,7 +4718,7 @@
           <p:cNvPr id="3" name="内容占位符 2">
             <a:extLst>
               <a:ext uri="{FF2B5EF4-FFF2-40B4-BE49-F238E27FC236}">
-                <a16:creationId xmlns:a16="http://schemas.microsoft.com/office/drawing/2014/main" id="{65B773BF-8D7E-447B-99B4-F29841BEF59C}"/>
+                <a16:creationId xmlns:a16="http://schemas.microsoft.com/office/drawing/2014/main" id="{69B00410-0AA5-45E1-9ECB-0D42BEFA8C53}"/>
               </a:ext>
             </a:extLst>
           </p:cNvPr>
@@ -4223,72 +4736,60 @@
           <a:p>
             <a:r>
               <a:rPr lang="en-US" altLang="zh-CN" dirty="0"/>
-              <a:t>Data</a:t>
+              <a:t>My own desktop GPU: GTX 1080 TI (cutting edge single-precision)</a:t>
+            </a:r>
+          </a:p>
+          <a:p>
+            <a:r>
+              <a:rPr lang="en-US" altLang="zh-CN" dirty="0"/>
+              <a:t>Azure(or AWS) cluster GPU available: V100, P100, K80 (double-precision, more memory)</a:t>
+            </a:r>
+          </a:p>
+          <a:p>
+            <a:r>
+              <a:rPr lang="en-US" altLang="zh-CN" dirty="0"/>
+              <a:t>GTX 1080 TI(~$750) is the same generation as P100 (~ $ 8000)</a:t>
+            </a:r>
+          </a:p>
+          <a:p>
+            <a:r>
+              <a:rPr lang="en-US" altLang="zh-CN" dirty="0"/>
+              <a:t>Test</a:t>
             </a:r>
           </a:p>
           <a:p>
             <a:pPr lvl="1"/>
             <a:r>
               <a:rPr lang="en-US" altLang="zh-CN" dirty="0"/>
-              <a:t>MNIST dataset</a:t>
-            </a:r>
-          </a:p>
-          <a:p>
-            <a:pPr lvl="2"/>
-            <a:r>
-              <a:rPr lang="en-US" altLang="zh-CN" dirty="0"/>
-              <a:t>60000 handwritten 0-9 digits images for training, 10000 for test</a:t>
-            </a:r>
-          </a:p>
-          <a:p>
-            <a:pPr lvl="2"/>
-            <a:r>
-              <a:rPr lang="en-US" altLang="zh-CN" dirty="0"/>
-              <a:t>Original shape 28x28, resized to 32x32</a:t>
+              <a:t>One epoch of running MNIST(10000 sample subset)</a:t>
+            </a:r>
+            <a:r>
+              <a:rPr lang="zh-CN" altLang="en-US"/>
+              <a:t> </a:t>
+            </a:r>
+            <a:r>
+              <a:rPr lang="en-US" altLang="zh-CN"/>
+              <a:t>on </a:t>
+            </a:r>
+            <a:r>
+              <a:rPr lang="en-US" altLang="zh-CN" dirty="0"/>
+              <a:t>our residual network takes 200 s on my machine and takes 680s on one K80</a:t>
             </a:r>
           </a:p>
           <a:p>
             <a:pPr lvl="1"/>
             <a:r>
               <a:rPr lang="en-US" altLang="zh-CN" dirty="0"/>
-              <a:t>CIFAR10 dataset</a:t>
-            </a:r>
-          </a:p>
-          <a:p>
-            <a:pPr lvl="2"/>
-            <a:r>
-              <a:rPr lang="en-US" altLang="zh-CN" dirty="0"/>
-              <a:t>50000 natural images of 10 classes like airplane, automobile, cat, dog, </a:t>
-            </a:r>
-            <a:r>
-              <a:rPr lang="en-US" altLang="zh-CN" dirty="0" err="1"/>
-              <a:t>etc</a:t>
-            </a:r>
-            <a:r>
-              <a:rPr lang="en-US" altLang="zh-CN" dirty="0"/>
-              <a:t> for training, 10000 for test</a:t>
-            </a:r>
-          </a:p>
-          <a:p>
-            <a:pPr lvl="2"/>
-            <a:r>
-              <a:rPr lang="en-US" altLang="zh-CN" dirty="0"/>
-              <a:t>Original shape 32x32</a:t>
-            </a:r>
-          </a:p>
-          <a:p>
-            <a:pPr lvl="1"/>
-            <a:r>
-              <a:rPr lang="en-US" altLang="zh-CN" dirty="0"/>
-              <a:t>Head Pose Image dataset</a:t>
-            </a:r>
-          </a:p>
-          <a:p>
-            <a:pPr lvl="2"/>
-            <a:r>
-              <a:rPr lang="en-US" altLang="zh-CN" dirty="0"/>
-              <a:t>http://www-prima.inrialpes.fr/perso/Gourier/Faces/HPDatabase.html</a:t>
-            </a:r>
+              <a:t>https://azure.microsoft.com/en-us/pricing/details/virtual-machines/linux/</a:t>
+            </a:r>
+          </a:p>
+          <a:p>
+            <a:pPr marL="457200" lvl="1" indent="0">
+              <a:buNone/>
+            </a:pPr>
+            <a:endParaRPr lang="en-US" altLang="zh-CN" dirty="0"/>
+          </a:p>
+          <a:p>
             <a:endParaRPr lang="zh-CN" altLang="en-US" dirty="0"/>
           </a:p>
         </p:txBody>
@@ -4296,7 +4797,7 @@
     </p:spTree>
     <p:extLst>
       <p:ext uri="{BB962C8B-B14F-4D97-AF65-F5344CB8AC3E}">
-        <p14:creationId xmlns:p14="http://schemas.microsoft.com/office/powerpoint/2010/main" val="996506143"/>
+        <p14:creationId xmlns:p14="http://schemas.microsoft.com/office/powerpoint/2010/main" val="1330275237"/>
       </p:ext>
     </p:extLst>
   </p:cSld>
@@ -4346,11 +4847,8 @@
           <a:p>
             <a:r>
               <a:rPr lang="en-US" altLang="zh-CN" dirty="0"/>
-              <a:t>Compression and Classification</a:t>
-            </a:r>
-            <a:br>
-              <a:rPr lang="en-US" altLang="zh-CN" dirty="0"/>
-            </a:br>
+              <a:t>Data</a:t>
+            </a:r>
             <a:endParaRPr lang="zh-CN" altLang="en-US" dirty="0"/>
           </a:p>
         </p:txBody>
@@ -4378,94 +4876,71 @@
           <a:p>
             <a:r>
               <a:rPr lang="en-US" altLang="zh-CN" dirty="0"/>
-              <a:t>Next Step</a:t>
+              <a:t>MNIST dataset</a:t>
             </a:r>
           </a:p>
           <a:p>
             <a:pPr lvl="1"/>
             <a:r>
-              <a:rPr lang="en-US" altLang="zh-CN" dirty="0">
-                <a:solidFill>
-                  <a:srgbClr val="FF0000"/>
-                </a:solidFill>
-              </a:rPr>
-              <a:t>Classification part is not rate variable</a:t>
+              <a:rPr lang="en-US" altLang="zh-CN" dirty="0"/>
+              <a:t>60000 handwritten 0-9 digits images for training, 10000 for test</a:t>
             </a:r>
           </a:p>
           <a:p>
             <a:pPr lvl="1"/>
             <a:r>
               <a:rPr lang="en-US" altLang="zh-CN" dirty="0"/>
-              <a:t>Tuning parameter for multi-objective optimization or </a:t>
-            </a:r>
-            <a:r>
-              <a:rPr lang="en-US" altLang="zh-CN" dirty="0">
-                <a:solidFill>
-                  <a:srgbClr val="FFC000"/>
-                </a:solidFill>
-              </a:rPr>
-              <a:t>two stage (isolated) optimization</a:t>
+              <a:t>Original shape 28x28, resized to 32x32</a:t>
+            </a:r>
+          </a:p>
+          <a:p>
+            <a:r>
+              <a:rPr lang="en-US" altLang="zh-CN" dirty="0"/>
+              <a:t>CIFAR10 dataset</a:t>
             </a:r>
           </a:p>
           <a:p>
             <a:pPr lvl="1"/>
             <a:r>
-              <a:rPr lang="en-US" altLang="zh-CN" dirty="0">
-                <a:solidFill>
-                  <a:srgbClr val="FF0000"/>
-                </a:solidFill>
-              </a:rPr>
-              <a:t>More complex </a:t>
-            </a:r>
-            <a:r>
-              <a:rPr lang="en-US" altLang="zh-CN" dirty="0" err="1">
-                <a:solidFill>
-                  <a:srgbClr val="FF0000"/>
-                </a:solidFill>
-              </a:rPr>
-              <a:t>iid</a:t>
-            </a:r>
-            <a:r>
-              <a:rPr lang="en-US" altLang="zh-CN" dirty="0">
-                <a:solidFill>
-                  <a:srgbClr val="FF0000"/>
-                </a:solidFill>
-              </a:rPr>
-              <a:t> image data, like CIFAR10, </a:t>
-            </a:r>
-            <a:r>
-              <a:rPr lang="en-US" altLang="zh-CN" dirty="0"/>
-              <a:t>ImageNet</a:t>
+              <a:rPr lang="en-US" altLang="zh-CN" dirty="0"/>
+              <a:t>50000 natural images of 10 classes like airplane, automobile, cat, dog, </a:t>
+            </a:r>
+            <a:r>
+              <a:rPr lang="en-US" altLang="zh-CN" dirty="0" err="1"/>
+              <a:t>etc</a:t>
+            </a:r>
+            <a:r>
+              <a:rPr lang="en-US" altLang="zh-CN" dirty="0"/>
+              <a:t> for training, 10000 for test</a:t>
             </a:r>
           </a:p>
           <a:p>
             <a:pPr lvl="1"/>
             <a:r>
-              <a:rPr lang="en-US" altLang="zh-CN" dirty="0">
-                <a:solidFill>
-                  <a:srgbClr val="FFC000"/>
-                </a:solidFill>
-              </a:rPr>
-              <a:t>Video data, and add LSTM for patch data?</a:t>
-            </a:r>
-            <a:r>
-              <a:rPr lang="en-US" altLang="zh-CN" dirty="0"/>
-              <a:t> for frame data?</a:t>
+              <a:rPr lang="en-US" altLang="zh-CN" dirty="0"/>
+              <a:t>Original shape 32x32</a:t>
+            </a:r>
+          </a:p>
+          <a:p>
+            <a:r>
+              <a:rPr lang="en-US" altLang="zh-CN" dirty="0"/>
+              <a:t>Head Pose Image dataset</a:t>
             </a:r>
           </a:p>
           <a:p>
             <a:pPr lvl="1"/>
             <a:r>
               <a:rPr lang="en-US" altLang="zh-CN" dirty="0"/>
-              <a:t>Web crawler for retrieving large volume of data to search for architecture and compressing images</a:t>
-            </a:r>
+              <a:t>http://www-prima.inrialpes.fr/perso/Gourier/Faces/HPDatabase.html</a:t>
+            </a:r>
+            <a:endParaRPr lang="zh-CN" altLang="en-US" dirty="0"/>
           </a:p>
         </p:txBody>
       </p:sp>
     </p:spTree>
     <p:extLst>
       <p:ext uri="{BB962C8B-B14F-4D97-AF65-F5344CB8AC3E}">
-        <p14:creationId xmlns:p14="http://schemas.microsoft.com/office/powerpoint/2010/main" val="3865998934"/>
+        <p14:creationId xmlns:p14="http://schemas.microsoft.com/office/powerpoint/2010/main" val="996506143"/>
       </p:ext>
     </p:extLst>
   </p:cSld>
@@ -4497,7 +4972,7 @@
           <p:cNvPr id="2" name="标题 1">
             <a:extLst>
               <a:ext uri="{FF2B5EF4-FFF2-40B4-BE49-F238E27FC236}">
-                <a16:creationId xmlns:a16="http://schemas.microsoft.com/office/drawing/2014/main" id="{7B2A1942-1BEC-40D2-9DC4-D7C87FB14784}"/>
+                <a16:creationId xmlns:a16="http://schemas.microsoft.com/office/drawing/2014/main" id="{7E4CFA14-E8C9-4F79-B31E-7AC8C0F7ADF4}"/>
               </a:ext>
             </a:extLst>
           </p:cNvPr>
@@ -4517,6 +4992,9 @@
               <a:rPr lang="en-US" altLang="zh-CN" dirty="0"/>
               <a:t>Compression and Classification</a:t>
             </a:r>
+            <a:br>
+              <a:rPr lang="en-US" altLang="zh-CN" dirty="0"/>
+            </a:br>
             <a:endParaRPr lang="zh-CN" altLang="en-US" dirty="0"/>
           </a:p>
         </p:txBody>
@@ -4526,7 +5004,7 @@
           <p:cNvPr id="3" name="内容占位符 2">
             <a:extLst>
               <a:ext uri="{FF2B5EF4-FFF2-40B4-BE49-F238E27FC236}">
-                <a16:creationId xmlns:a16="http://schemas.microsoft.com/office/drawing/2014/main" id="{BC65CE38-BA13-4505-BDCA-8479C11833B0}"/>
+                <a16:creationId xmlns:a16="http://schemas.microsoft.com/office/drawing/2014/main" id="{65B773BF-8D7E-447B-99B4-F29841BEF59C}"/>
               </a:ext>
             </a:extLst>
           </p:cNvPr>
@@ -4539,23 +5017,99 @@
         </p:nvSpPr>
         <p:spPr/>
         <p:txBody>
-          <a:bodyPr>
-            <a:normAutofit/>
-          </a:bodyPr>
-          <a:lstStyle/>
-          <a:p>
-            <a:r>
-              <a:rPr lang="en-US" altLang="zh-CN" dirty="0"/>
+          <a:bodyPr/>
+          <a:lstStyle/>
+          <a:p>
+            <a:r>
+              <a:rPr lang="en-US" altLang="zh-CN" dirty="0"/>
+              <a:t>Milestones</a:t>
+            </a:r>
+          </a:p>
+          <a:p>
+            <a:pPr lvl="1"/>
+            <a:r>
+              <a:rPr lang="en-US" altLang="zh-CN" dirty="0">
+                <a:solidFill>
+                  <a:srgbClr val="FF0000"/>
+                </a:solidFill>
+              </a:rPr>
               <a:t>Classification part is not rate variable</a:t>
             </a:r>
-            <a:endParaRPr lang="zh-CN" altLang="en-US" dirty="0"/>
+          </a:p>
+          <a:p>
+            <a:pPr lvl="1"/>
+            <a:r>
+              <a:rPr lang="en-US" altLang="zh-CN" dirty="0"/>
+              <a:t>Tuning parameter for multi-objective optimization or </a:t>
+            </a:r>
+            <a:r>
+              <a:rPr lang="en-US" altLang="zh-CN" dirty="0">
+                <a:solidFill>
+                  <a:srgbClr val="FFC000"/>
+                </a:solidFill>
+              </a:rPr>
+              <a:t>two stage (isolated) optimization</a:t>
+            </a:r>
+          </a:p>
+          <a:p>
+            <a:pPr lvl="1"/>
+            <a:r>
+              <a:rPr lang="en-US" altLang="zh-CN" dirty="0">
+                <a:solidFill>
+                  <a:srgbClr val="FF0000"/>
+                </a:solidFill>
+              </a:rPr>
+              <a:t>More complex </a:t>
+            </a:r>
+            <a:r>
+              <a:rPr lang="en-US" altLang="zh-CN" dirty="0" err="1">
+                <a:solidFill>
+                  <a:srgbClr val="FF0000"/>
+                </a:solidFill>
+              </a:rPr>
+              <a:t>iid</a:t>
+            </a:r>
+            <a:r>
+              <a:rPr lang="en-US" altLang="zh-CN" dirty="0">
+                <a:solidFill>
+                  <a:srgbClr val="FF0000"/>
+                </a:solidFill>
+              </a:rPr>
+              <a:t> image data, like CIFAR10, </a:t>
+            </a:r>
+            <a:r>
+              <a:rPr lang="en-US" altLang="zh-CN" dirty="0"/>
+              <a:t>ImageNet</a:t>
+            </a:r>
+          </a:p>
+          <a:p>
+            <a:pPr lvl="1"/>
+            <a:r>
+              <a:rPr lang="en-US" altLang="zh-CN" dirty="0">
+                <a:solidFill>
+                  <a:srgbClr val="FFC000"/>
+                </a:solidFill>
+              </a:rPr>
+              <a:t>Video data, and add LSTM for patch data?</a:t>
+            </a:r>
+            <a:r>
+              <a:rPr lang="en-US" altLang="zh-CN" dirty="0"/>
+              <a:t> for frame data?</a:t>
+            </a:r>
+          </a:p>
+          <a:p>
+            <a:pPr lvl="1"/>
+            <a:r>
+              <a:rPr lang="en-US" altLang="zh-CN" dirty="0"/>
+              <a:t>Web crawler for retrieving large volume of data to search for architecture and compressing images</a:t>
+            </a:r>
           </a:p>
         </p:txBody>
       </p:sp>
     </p:spTree>
     <p:extLst>
       <p:ext uri="{BB962C8B-B14F-4D97-AF65-F5344CB8AC3E}">
-        <p14:creationId xmlns:p14="http://schemas.microsoft.com/office/powerpoint/2010/main" val="2990382200"/>
+        <p14:creationId xmlns:p14="http://schemas.microsoft.com/office/powerpoint/2010/main" val="3865998934"/>
       </p:ext>
     </p:extLst>
   </p:cSld>
@@ -4638,14 +5192,20 @@
               <a:rPr lang="en-US" altLang="zh-CN" dirty="0"/>
               <a:t>Classification part is not rate variable</a:t>
             </a:r>
-            <a:endParaRPr lang="zh-CN" altLang="en-US" dirty="0"/>
+          </a:p>
+          <a:p>
+            <a:pPr lvl="1"/>
+            <a:r>
+              <a:rPr lang="en-US" altLang="zh-CN" dirty="0"/>
+              <a:t>With pure LSTM based network, we can achieve rate variable classification</a:t>
+            </a:r>
           </a:p>
         </p:txBody>
       </p:sp>
     </p:spTree>
     <p:extLst>
       <p:ext uri="{BB962C8B-B14F-4D97-AF65-F5344CB8AC3E}">
-        <p14:creationId xmlns:p14="http://schemas.microsoft.com/office/powerpoint/2010/main" val="802639922"/>
+        <p14:creationId xmlns:p14="http://schemas.microsoft.com/office/powerpoint/2010/main" val="445564549"/>
       </p:ext>
     </p:extLst>
   </p:cSld>
@@ -4677,7 +5237,7 @@
           <p:cNvPr id="2" name="标题 1">
             <a:extLst>
               <a:ext uri="{FF2B5EF4-FFF2-40B4-BE49-F238E27FC236}">
-                <a16:creationId xmlns:a16="http://schemas.microsoft.com/office/drawing/2014/main" id="{7E4CFA14-E8C9-4F79-B31E-7AC8C0F7ADF4}"/>
+                <a16:creationId xmlns:a16="http://schemas.microsoft.com/office/drawing/2014/main" id="{7B2A1942-1BEC-40D2-9DC4-D7C87FB14784}"/>
               </a:ext>
             </a:extLst>
           </p:cNvPr>
@@ -4688,91 +5248,45 @@
             <p:ph type="title"/>
           </p:nvPr>
         </p:nvSpPr>
-        <p:spPr>
-          <a:xfrm>
-            <a:off x="838200" y="681037"/>
-            <a:ext cx="10515600" cy="1325563"/>
-          </a:xfrm>
-        </p:spPr>
+        <p:spPr/>
+        <p:txBody>
+          <a:bodyPr/>
+          <a:lstStyle/>
+          <a:p>
+            <a:r>
+              <a:rPr lang="en-US" altLang="zh-CN" dirty="0"/>
+              <a:t>Compression and Classification</a:t>
+            </a:r>
+            <a:endParaRPr lang="zh-CN" altLang="en-US" dirty="0"/>
+          </a:p>
+        </p:txBody>
+      </p:sp>
+      <p:sp>
+        <p:nvSpPr>
+          <p:cNvPr id="3" name="内容占位符 2">
+            <a:extLst>
+              <a:ext uri="{FF2B5EF4-FFF2-40B4-BE49-F238E27FC236}">
+                <a16:creationId xmlns:a16="http://schemas.microsoft.com/office/drawing/2014/main" id="{BC65CE38-BA13-4505-BDCA-8479C11833B0}"/>
+              </a:ext>
+            </a:extLst>
+          </p:cNvPr>
+          <p:cNvSpPr>
+            <a:spLocks noGrp="1"/>
+          </p:cNvSpPr>
+          <p:nvPr>
+            <p:ph idx="1"/>
+          </p:nvPr>
+        </p:nvSpPr>
+        <p:spPr/>
         <p:txBody>
           <a:bodyPr>
-            <a:normAutofit fontScale="90000"/>
+            <a:normAutofit/>
           </a:bodyPr>
           <a:lstStyle/>
           <a:p>
             <a:r>
               <a:rPr lang="en-US" altLang="zh-CN" dirty="0"/>
-              <a:t>Distributed Compression</a:t>
-            </a:r>
-            <a:br>
-              <a:rPr lang="en-US" altLang="zh-CN" dirty="0"/>
-            </a:br>
-            <a:br>
-              <a:rPr lang="en-US" altLang="zh-CN" dirty="0"/>
-            </a:br>
-            <a:endParaRPr lang="zh-CN" altLang="en-US" dirty="0"/>
-          </a:p>
-        </p:txBody>
-      </p:sp>
-      <p:sp>
-        <p:nvSpPr>
-          <p:cNvPr id="3" name="内容占位符 2">
-            <a:extLst>
-              <a:ext uri="{FF2B5EF4-FFF2-40B4-BE49-F238E27FC236}">
-                <a16:creationId xmlns:a16="http://schemas.microsoft.com/office/drawing/2014/main" id="{65B773BF-8D7E-447B-99B4-F29841BEF59C}"/>
-              </a:ext>
-            </a:extLst>
-          </p:cNvPr>
-          <p:cNvSpPr>
-            <a:spLocks noGrp="1"/>
-          </p:cNvSpPr>
-          <p:nvPr>
-            <p:ph idx="1"/>
-          </p:nvPr>
-        </p:nvSpPr>
-        <p:spPr/>
-        <p:txBody>
-          <a:bodyPr/>
-          <a:lstStyle/>
-          <a:p>
-            <a:r>
-              <a:rPr lang="en-US" altLang="zh-CN" dirty="0"/>
-              <a:t>Next Step</a:t>
-            </a:r>
-          </a:p>
-          <a:p>
-            <a:pPr lvl="1"/>
-            <a:r>
-              <a:rPr lang="en-US" altLang="zh-CN" dirty="0"/>
-              <a:t>Split image dataset into several subset of data</a:t>
-            </a:r>
-          </a:p>
-          <a:p>
-            <a:pPr lvl="1"/>
-            <a:r>
-              <a:rPr lang="en-US" altLang="zh-CN" dirty="0"/>
-              <a:t>Each slave node has a sperate encoder</a:t>
-            </a:r>
-          </a:p>
-          <a:p>
-            <a:pPr lvl="1"/>
-            <a:r>
-              <a:rPr lang="en-US" altLang="zh-CN" dirty="0"/>
-              <a:t>The main host receive the codes from slave nodes and concatenate them together to decode them from a single decoder</a:t>
-            </a:r>
-          </a:p>
-          <a:p>
-            <a:pPr lvl="1"/>
-            <a:r>
-              <a:rPr lang="en-US" altLang="zh-CN" dirty="0"/>
-              <a:t>The system should yield better rate-distortion curve compared to decode each slave node separately</a:t>
-            </a:r>
-          </a:p>
-          <a:p>
-            <a:pPr lvl="1"/>
-            <a:r>
-              <a:rPr lang="en-US" altLang="zh-CN" dirty="0"/>
-              <a:t>Possible to add classification and other objectives</a:t>
+              <a:t>Two stage (isolated) optimization</a:t>
             </a:r>
           </a:p>
         </p:txBody>
@@ -4780,7 +5294,7 @@
     </p:spTree>
     <p:extLst>
       <p:ext uri="{BB962C8B-B14F-4D97-AF65-F5344CB8AC3E}">
-        <p14:creationId xmlns:p14="http://schemas.microsoft.com/office/powerpoint/2010/main" val="1769019586"/>
+        <p14:creationId xmlns:p14="http://schemas.microsoft.com/office/powerpoint/2010/main" val="2990382200"/>
       </p:ext>
     </p:extLst>
   </p:cSld>
@@ -4812,7 +5326,7 @@
           <p:cNvPr id="2" name="标题 1">
             <a:extLst>
               <a:ext uri="{FF2B5EF4-FFF2-40B4-BE49-F238E27FC236}">
-                <a16:creationId xmlns:a16="http://schemas.microsoft.com/office/drawing/2014/main" id="{7E4CFA14-E8C9-4F79-B31E-7AC8C0F7ADF4}"/>
+                <a16:creationId xmlns:a16="http://schemas.microsoft.com/office/drawing/2014/main" id="{7B2A1942-1BEC-40D2-9DC4-D7C87FB14784}"/>
               </a:ext>
             </a:extLst>
           </p:cNvPr>
@@ -4823,106 +5337,182 @@
             <p:ph type="title"/>
           </p:nvPr>
         </p:nvSpPr>
-        <p:spPr>
-          <a:xfrm>
-            <a:off x="838200" y="681037"/>
-            <a:ext cx="10515600" cy="1325563"/>
-          </a:xfrm>
-        </p:spPr>
+        <p:spPr/>
+        <p:txBody>
+          <a:bodyPr/>
+          <a:lstStyle/>
+          <a:p>
+            <a:r>
+              <a:rPr lang="en-US" altLang="zh-CN" dirty="0"/>
+              <a:t>Compression and Classification</a:t>
+            </a:r>
+            <a:endParaRPr lang="zh-CN" altLang="en-US" dirty="0"/>
+          </a:p>
+        </p:txBody>
+      </p:sp>
+      <p:sp>
+        <p:nvSpPr>
+          <p:cNvPr id="3" name="内容占位符 2">
+            <a:extLst>
+              <a:ext uri="{FF2B5EF4-FFF2-40B4-BE49-F238E27FC236}">
+                <a16:creationId xmlns:a16="http://schemas.microsoft.com/office/drawing/2014/main" id="{BC65CE38-BA13-4505-BDCA-8479C11833B0}"/>
+              </a:ext>
+            </a:extLst>
+          </p:cNvPr>
+          <p:cNvSpPr>
+            <a:spLocks noGrp="1"/>
+          </p:cNvSpPr>
+          <p:nvPr>
+            <p:ph idx="1"/>
+          </p:nvPr>
+        </p:nvSpPr>
+        <p:spPr/>
         <p:txBody>
           <a:bodyPr>
-            <a:normAutofit fontScale="90000"/>
+            <a:normAutofit/>
           </a:bodyPr>
           <a:lstStyle/>
           <a:p>
             <a:r>
               <a:rPr lang="en-US" altLang="zh-CN" dirty="0"/>
-              <a:t>Codec Conversion</a:t>
-            </a:r>
-            <a:br>
-              <a:rPr lang="en-US" altLang="zh-CN" dirty="0"/>
-            </a:br>
-            <a:br>
-              <a:rPr lang="en-US" altLang="zh-CN" dirty="0"/>
-            </a:br>
+              <a:t>CIFAR10</a:t>
+            </a:r>
             <a:endParaRPr lang="zh-CN" altLang="en-US" dirty="0"/>
-          </a:p>
-        </p:txBody>
-      </p:sp>
-      <p:sp>
-        <p:nvSpPr>
-          <p:cNvPr id="3" name="内容占位符 2">
-            <a:extLst>
-              <a:ext uri="{FF2B5EF4-FFF2-40B4-BE49-F238E27FC236}">
-                <a16:creationId xmlns:a16="http://schemas.microsoft.com/office/drawing/2014/main" id="{65B773BF-8D7E-447B-99B4-F29841BEF59C}"/>
-              </a:ext>
-            </a:extLst>
-          </p:cNvPr>
-          <p:cNvSpPr>
-            <a:spLocks noGrp="1"/>
-          </p:cNvSpPr>
-          <p:nvPr>
-            <p:ph idx="1"/>
-          </p:nvPr>
-        </p:nvSpPr>
-        <p:spPr/>
-        <p:txBody>
-          <a:bodyPr/>
-          <a:lstStyle/>
-          <a:p>
-            <a:r>
-              <a:rPr lang="en-US" altLang="zh-CN" dirty="0"/>
-              <a:t>Next Step</a:t>
-            </a:r>
-          </a:p>
-          <a:p>
-            <a:pPr lvl="1"/>
-            <a:r>
-              <a:rPr lang="en-US" altLang="zh-CN" dirty="0"/>
-              <a:t>Convert between classical codecs like jpeg, </a:t>
-            </a:r>
-            <a:r>
-              <a:rPr lang="en-US" altLang="zh-CN" dirty="0" err="1"/>
-              <a:t>png</a:t>
-            </a:r>
-            <a:r>
-              <a:rPr lang="en-US" altLang="zh-CN" dirty="0"/>
-              <a:t> and neural network based codecs</a:t>
-            </a:r>
-          </a:p>
-          <a:p>
-            <a:pPr lvl="1"/>
-            <a:r>
-              <a:rPr lang="en-US" altLang="zh-CN" dirty="0"/>
-              <a:t>Convert between neural network based codecs</a:t>
-            </a:r>
-          </a:p>
-          <a:p>
-            <a:pPr lvl="1"/>
-            <a:r>
-              <a:rPr lang="en-US" altLang="zh-CN" dirty="0"/>
-              <a:t>Convert between classical codecs</a:t>
-            </a:r>
-          </a:p>
-          <a:p>
-            <a:pPr lvl="1"/>
-            <a:r>
-              <a:rPr lang="en-US" altLang="zh-CN" dirty="0"/>
-              <a:t>Can we convert between lossy compressed codes and lossless compressed codes with neural network</a:t>
-            </a:r>
-          </a:p>
-          <a:p>
-            <a:pPr marL="457200" lvl="1" indent="0">
-              <a:buNone/>
-            </a:pPr>
-            <a:endParaRPr lang="en-US" altLang="zh-CN" dirty="0"/>
           </a:p>
         </p:txBody>
       </p:sp>
     </p:spTree>
     <p:extLst>
       <p:ext uri="{BB962C8B-B14F-4D97-AF65-F5344CB8AC3E}">
-        <p14:creationId xmlns:p14="http://schemas.microsoft.com/office/powerpoint/2010/main" val="2260779395"/>
+        <p14:creationId xmlns:p14="http://schemas.microsoft.com/office/powerpoint/2010/main" val="802639922"/>
+      </p:ext>
+    </p:extLst>
+  </p:cSld>
+  <p:clrMapOvr>
+    <a:masterClrMapping/>
+  </p:clrMapOvr>
+</p:sld>
+</file>
+
+<file path=ppt/slides/slide9.xml><?xml version="1.0" encoding="utf-8"?>
+<p:sld xmlns:a="http://schemas.openxmlformats.org/drawingml/2006/main" xmlns:r="http://schemas.openxmlformats.org/officeDocument/2006/relationships" xmlns:p="http://schemas.openxmlformats.org/presentationml/2006/main">
+  <p:cSld>
+    <p:spTree>
+      <p:nvGrpSpPr>
+        <p:cNvPr id="1" name=""/>
+        <p:cNvGrpSpPr/>
+        <p:nvPr/>
+      </p:nvGrpSpPr>
+      <p:grpSpPr>
+        <a:xfrm>
+          <a:off x="0" y="0"/>
+          <a:ext cx="0" cy="0"/>
+          <a:chOff x="0" y="0"/>
+          <a:chExt cx="0" cy="0"/>
+        </a:xfrm>
+      </p:grpSpPr>
+      <p:sp>
+        <p:nvSpPr>
+          <p:cNvPr id="2" name="标题 1">
+            <a:extLst>
+              <a:ext uri="{FF2B5EF4-FFF2-40B4-BE49-F238E27FC236}">
+                <a16:creationId xmlns:a16="http://schemas.microsoft.com/office/drawing/2014/main" id="{7B2A1942-1BEC-40D2-9DC4-D7C87FB14784}"/>
+              </a:ext>
+            </a:extLst>
+          </p:cNvPr>
+          <p:cNvSpPr>
+            <a:spLocks noGrp="1"/>
+          </p:cNvSpPr>
+          <p:nvPr>
+            <p:ph type="title"/>
+          </p:nvPr>
+        </p:nvSpPr>
+        <p:spPr/>
+        <p:txBody>
+          <a:bodyPr/>
+          <a:lstStyle/>
+          <a:p>
+            <a:r>
+              <a:rPr lang="en-US" altLang="zh-CN" dirty="0"/>
+              <a:t>Compression and Classification</a:t>
+            </a:r>
+            <a:endParaRPr lang="zh-CN" altLang="en-US" dirty="0"/>
+          </a:p>
+        </p:txBody>
+      </p:sp>
+      <p:sp>
+        <p:nvSpPr>
+          <p:cNvPr id="3" name="内容占位符 2">
+            <a:extLst>
+              <a:ext uri="{FF2B5EF4-FFF2-40B4-BE49-F238E27FC236}">
+                <a16:creationId xmlns:a16="http://schemas.microsoft.com/office/drawing/2014/main" id="{BC65CE38-BA13-4505-BDCA-8479C11833B0}"/>
+              </a:ext>
+            </a:extLst>
+          </p:cNvPr>
+          <p:cNvSpPr>
+            <a:spLocks noGrp="1"/>
+          </p:cNvSpPr>
+          <p:nvPr>
+            <p:ph idx="1"/>
+          </p:nvPr>
+        </p:nvSpPr>
+        <p:spPr/>
+        <p:txBody>
+          <a:bodyPr>
+            <a:normAutofit/>
+          </a:bodyPr>
+          <a:lstStyle/>
+          <a:p>
+            <a:r>
+              <a:rPr lang="en-US" altLang="zh-CN" dirty="0"/>
+              <a:t>Patched LSTM</a:t>
+            </a:r>
+          </a:p>
+          <a:p>
+            <a:pPr lvl="1"/>
+            <a:r>
+              <a:rPr lang="en-US" altLang="zh-CN" dirty="0"/>
+              <a:t>Pad and </a:t>
+            </a:r>
+            <a:r>
+              <a:rPr lang="en-US" altLang="zh-CN" dirty="0" err="1"/>
+              <a:t>unpad</a:t>
+            </a:r>
+            <a:r>
+              <a:rPr lang="en-US" altLang="zh-CN" dirty="0"/>
+              <a:t> different size of images (sequence), otherwise we can only use </a:t>
+            </a:r>
+            <a:r>
+              <a:rPr lang="en-US" altLang="zh-CN" dirty="0" err="1"/>
+              <a:t>batch_size</a:t>
+            </a:r>
+            <a:r>
+              <a:rPr lang="en-US" altLang="zh-CN" dirty="0"/>
+              <a:t> = 1</a:t>
+            </a:r>
+          </a:p>
+          <a:p>
+            <a:pPr lvl="1"/>
+            <a:r>
+              <a:rPr lang="en-US" altLang="zh-CN"/>
+              <a:t>(Variable rate) </a:t>
+            </a:r>
+            <a:r>
+              <a:rPr lang="en-US" altLang="zh-CN" dirty="0"/>
+              <a:t>classification for non-uniform sizes </a:t>
+            </a:r>
+            <a:r>
+              <a:rPr lang="en-US" altLang="zh-CN"/>
+              <a:t>of images</a:t>
+            </a:r>
+            <a:endParaRPr lang="en-US" altLang="zh-CN" dirty="0"/>
+          </a:p>
+        </p:txBody>
+      </p:sp>
+    </p:spTree>
+    <p:extLst>
+      <p:ext uri="{BB962C8B-B14F-4D97-AF65-F5344CB8AC3E}">
+        <p14:creationId xmlns:p14="http://schemas.microsoft.com/office/powerpoint/2010/main" val="3792319055"/>
       </p:ext>
     </p:extLst>
   </p:cSld>

</xml_diff>

<commit_message>
update ONR and report
</commit_message>
<xml_diff>
--- a/doc/Report/ongoing.pptx
+++ b/doc/Report/ongoing.pptx
@@ -5,20 +5,21 @@
     <p:sldMasterId id="2147483648" r:id="rId1"/>
   </p:sldMasterIdLst>
   <p:notesMasterIdLst>
-    <p:notesMasterId r:id="rId13"/>
+    <p:notesMasterId r:id="rId14"/>
   </p:notesMasterIdLst>
   <p:sldIdLst>
     <p:sldId id="271" r:id="rId2"/>
     <p:sldId id="295" r:id="rId3"/>
     <p:sldId id="308" r:id="rId4"/>
-    <p:sldId id="296" r:id="rId5"/>
-    <p:sldId id="302" r:id="rId6"/>
-    <p:sldId id="309" r:id="rId7"/>
-    <p:sldId id="306" r:id="rId8"/>
-    <p:sldId id="307" r:id="rId9"/>
-    <p:sldId id="310" r:id="rId10"/>
-    <p:sldId id="304" r:id="rId11"/>
-    <p:sldId id="305" r:id="rId12"/>
+    <p:sldId id="311" r:id="rId5"/>
+    <p:sldId id="296" r:id="rId6"/>
+    <p:sldId id="302" r:id="rId7"/>
+    <p:sldId id="309" r:id="rId8"/>
+    <p:sldId id="306" r:id="rId9"/>
+    <p:sldId id="307" r:id="rId10"/>
+    <p:sldId id="310" r:id="rId11"/>
+    <p:sldId id="304" r:id="rId12"/>
+    <p:sldId id="305" r:id="rId13"/>
   </p:sldIdLst>
   <p:sldSz cx="12192000" cy="6858000"/>
   <p:notesSz cx="6858000" cy="9144000"/>
@@ -207,7 +208,7 @@
           <a:p>
             <a:fld id="{97BE2177-E45B-449F-AE2E-ED4743253C6D}" type="datetimeFigureOut">
               <a:rPr lang="zh-CN" altLang="en-US" smtClean="0"/>
-              <a:t>2018/9/5</a:t>
+              <a:t>2018/9/9</a:t>
             </a:fld>
             <a:endParaRPr lang="zh-CN" altLang="en-US"/>
           </a:p>
@@ -623,7 +624,7 @@
           <a:p>
             <a:fld id="{C676D08B-1E4C-4901-ABEC-209650D3181D}" type="slidenum">
               <a:rPr lang="zh-CN" altLang="en-US" smtClean="0"/>
-              <a:t>6</a:t>
+              <a:t>7</a:t>
             </a:fld>
             <a:endParaRPr lang="zh-CN" altLang="en-US"/>
           </a:p>
@@ -707,7 +708,7 @@
           <a:p>
             <a:fld id="{C676D08B-1E4C-4901-ABEC-209650D3181D}" type="slidenum">
               <a:rPr lang="zh-CN" altLang="en-US" smtClean="0"/>
-              <a:t>7</a:t>
+              <a:t>8</a:t>
             </a:fld>
             <a:endParaRPr lang="zh-CN" altLang="en-US"/>
           </a:p>
@@ -791,7 +792,7 @@
           <a:p>
             <a:fld id="{C676D08B-1E4C-4901-ABEC-209650D3181D}" type="slidenum">
               <a:rPr lang="zh-CN" altLang="en-US" smtClean="0"/>
-              <a:t>8</a:t>
+              <a:t>9</a:t>
             </a:fld>
             <a:endParaRPr lang="zh-CN" altLang="en-US"/>
           </a:p>
@@ -875,7 +876,7 @@
           <a:p>
             <a:fld id="{C676D08B-1E4C-4901-ABEC-209650D3181D}" type="slidenum">
               <a:rPr lang="zh-CN" altLang="en-US" smtClean="0"/>
-              <a:t>9</a:t>
+              <a:t>10</a:t>
             </a:fld>
             <a:endParaRPr lang="zh-CN" altLang="en-US"/>
           </a:p>
@@ -1041,7 +1042,7 @@
           <a:p>
             <a:fld id="{B9614994-C529-43AC-BD2C-52D47B0301A5}" type="datetimeFigureOut">
               <a:rPr lang="zh-CN" altLang="en-US" smtClean="0"/>
-              <a:t>2018/9/5</a:t>
+              <a:t>2018/9/9</a:t>
             </a:fld>
             <a:endParaRPr lang="zh-CN" altLang="en-US"/>
           </a:p>
@@ -1239,7 +1240,7 @@
           <a:p>
             <a:fld id="{B9614994-C529-43AC-BD2C-52D47B0301A5}" type="datetimeFigureOut">
               <a:rPr lang="zh-CN" altLang="en-US" smtClean="0"/>
-              <a:t>2018/9/5</a:t>
+              <a:t>2018/9/9</a:t>
             </a:fld>
             <a:endParaRPr lang="zh-CN" altLang="en-US"/>
           </a:p>
@@ -1447,7 +1448,7 @@
           <a:p>
             <a:fld id="{B9614994-C529-43AC-BD2C-52D47B0301A5}" type="datetimeFigureOut">
               <a:rPr lang="zh-CN" altLang="en-US" smtClean="0"/>
-              <a:t>2018/9/5</a:t>
+              <a:t>2018/9/9</a:t>
             </a:fld>
             <a:endParaRPr lang="zh-CN" altLang="en-US"/>
           </a:p>
@@ -1645,7 +1646,7 @@
           <a:p>
             <a:fld id="{B9614994-C529-43AC-BD2C-52D47B0301A5}" type="datetimeFigureOut">
               <a:rPr lang="zh-CN" altLang="en-US" smtClean="0"/>
-              <a:t>2018/9/5</a:t>
+              <a:t>2018/9/9</a:t>
             </a:fld>
             <a:endParaRPr lang="zh-CN" altLang="en-US"/>
           </a:p>
@@ -1920,7 +1921,7 @@
           <a:p>
             <a:fld id="{B9614994-C529-43AC-BD2C-52D47B0301A5}" type="datetimeFigureOut">
               <a:rPr lang="zh-CN" altLang="en-US" smtClean="0"/>
-              <a:t>2018/9/5</a:t>
+              <a:t>2018/9/9</a:t>
             </a:fld>
             <a:endParaRPr lang="zh-CN" altLang="en-US"/>
           </a:p>
@@ -2185,7 +2186,7 @@
           <a:p>
             <a:fld id="{B9614994-C529-43AC-BD2C-52D47B0301A5}" type="datetimeFigureOut">
               <a:rPr lang="zh-CN" altLang="en-US" smtClean="0"/>
-              <a:t>2018/9/5</a:t>
+              <a:t>2018/9/9</a:t>
             </a:fld>
             <a:endParaRPr lang="zh-CN" altLang="en-US"/>
           </a:p>
@@ -2597,7 +2598,7 @@
           <a:p>
             <a:fld id="{B9614994-C529-43AC-BD2C-52D47B0301A5}" type="datetimeFigureOut">
               <a:rPr lang="zh-CN" altLang="en-US" smtClean="0"/>
-              <a:t>2018/9/5</a:t>
+              <a:t>2018/9/9</a:t>
             </a:fld>
             <a:endParaRPr lang="zh-CN" altLang="en-US"/>
           </a:p>
@@ -2738,7 +2739,7 @@
           <a:p>
             <a:fld id="{B9614994-C529-43AC-BD2C-52D47B0301A5}" type="datetimeFigureOut">
               <a:rPr lang="zh-CN" altLang="en-US" smtClean="0"/>
-              <a:t>2018/9/5</a:t>
+              <a:t>2018/9/9</a:t>
             </a:fld>
             <a:endParaRPr lang="zh-CN" altLang="en-US"/>
           </a:p>
@@ -2851,7 +2852,7 @@
           <a:p>
             <a:fld id="{B9614994-C529-43AC-BD2C-52D47B0301A5}" type="datetimeFigureOut">
               <a:rPr lang="zh-CN" altLang="en-US" smtClean="0"/>
-              <a:t>2018/9/5</a:t>
+              <a:t>2018/9/9</a:t>
             </a:fld>
             <a:endParaRPr lang="zh-CN" altLang="en-US"/>
           </a:p>
@@ -3162,7 +3163,7 @@
           <a:p>
             <a:fld id="{B9614994-C529-43AC-BD2C-52D47B0301A5}" type="datetimeFigureOut">
               <a:rPr lang="zh-CN" altLang="en-US" smtClean="0"/>
-              <a:t>2018/9/5</a:t>
+              <a:t>2018/9/9</a:t>
             </a:fld>
             <a:endParaRPr lang="zh-CN" altLang="en-US"/>
           </a:p>
@@ -3450,7 +3451,7 @@
           <a:p>
             <a:fld id="{B9614994-C529-43AC-BD2C-52D47B0301A5}" type="datetimeFigureOut">
               <a:rPr lang="zh-CN" altLang="en-US" smtClean="0"/>
-              <a:t>2018/9/5</a:t>
+              <a:t>2018/9/9</a:t>
             </a:fld>
             <a:endParaRPr lang="zh-CN" altLang="en-US"/>
           </a:p>
@@ -3691,7 +3692,7 @@
           <a:p>
             <a:fld id="{B9614994-C529-43AC-BD2C-52D47B0301A5}" type="datetimeFigureOut">
               <a:rPr lang="zh-CN" altLang="en-US" smtClean="0"/>
-              <a:t>2018/9/5</a:t>
+              <a:t>2018/9/9</a:t>
             </a:fld>
             <a:endParaRPr lang="zh-CN" altLang="en-US"/>
           </a:p>
@@ -4275,6 +4276,134 @@
           <p:cNvPr id="2" name="标题 1">
             <a:extLst>
               <a:ext uri="{FF2B5EF4-FFF2-40B4-BE49-F238E27FC236}">
+                <a16:creationId xmlns:a16="http://schemas.microsoft.com/office/drawing/2014/main" id="{7B2A1942-1BEC-40D2-9DC4-D7C87FB14784}"/>
+              </a:ext>
+            </a:extLst>
+          </p:cNvPr>
+          <p:cNvSpPr>
+            <a:spLocks noGrp="1"/>
+          </p:cNvSpPr>
+          <p:nvPr>
+            <p:ph type="title"/>
+          </p:nvPr>
+        </p:nvSpPr>
+        <p:spPr/>
+        <p:txBody>
+          <a:bodyPr/>
+          <a:lstStyle/>
+          <a:p>
+            <a:r>
+              <a:rPr lang="en-US" altLang="zh-CN" dirty="0"/>
+              <a:t>Compression and Classification</a:t>
+            </a:r>
+            <a:endParaRPr lang="zh-CN" altLang="en-US" dirty="0"/>
+          </a:p>
+        </p:txBody>
+      </p:sp>
+      <p:sp>
+        <p:nvSpPr>
+          <p:cNvPr id="3" name="内容占位符 2">
+            <a:extLst>
+              <a:ext uri="{FF2B5EF4-FFF2-40B4-BE49-F238E27FC236}">
+                <a16:creationId xmlns:a16="http://schemas.microsoft.com/office/drawing/2014/main" id="{BC65CE38-BA13-4505-BDCA-8479C11833B0}"/>
+              </a:ext>
+            </a:extLst>
+          </p:cNvPr>
+          <p:cNvSpPr>
+            <a:spLocks noGrp="1"/>
+          </p:cNvSpPr>
+          <p:nvPr>
+            <p:ph idx="1"/>
+          </p:nvPr>
+        </p:nvSpPr>
+        <p:spPr/>
+        <p:txBody>
+          <a:bodyPr>
+            <a:normAutofit/>
+          </a:bodyPr>
+          <a:lstStyle/>
+          <a:p>
+            <a:r>
+              <a:rPr lang="en-US" altLang="zh-CN" dirty="0"/>
+              <a:t>Patched LSTM</a:t>
+            </a:r>
+          </a:p>
+          <a:p>
+            <a:pPr lvl="1"/>
+            <a:r>
+              <a:rPr lang="en-US" altLang="zh-CN" dirty="0"/>
+              <a:t>Pad and </a:t>
+            </a:r>
+            <a:r>
+              <a:rPr lang="en-US" altLang="zh-CN" dirty="0" err="1"/>
+              <a:t>unpad</a:t>
+            </a:r>
+            <a:r>
+              <a:rPr lang="en-US" altLang="zh-CN" dirty="0"/>
+              <a:t> different size of images (sequence), otherwise we can only use </a:t>
+            </a:r>
+            <a:r>
+              <a:rPr lang="en-US" altLang="zh-CN" dirty="0" err="1"/>
+              <a:t>batch_size</a:t>
+            </a:r>
+            <a:r>
+              <a:rPr lang="en-US" altLang="zh-CN" dirty="0"/>
+              <a:t> = 1</a:t>
+            </a:r>
+          </a:p>
+          <a:p>
+            <a:pPr lvl="1"/>
+            <a:r>
+              <a:rPr lang="en-US" altLang="zh-CN"/>
+              <a:t>(Variable rate) </a:t>
+            </a:r>
+            <a:r>
+              <a:rPr lang="en-US" altLang="zh-CN" dirty="0"/>
+              <a:t>classification for non-uniform sizes </a:t>
+            </a:r>
+            <a:r>
+              <a:rPr lang="en-US" altLang="zh-CN"/>
+              <a:t>of images</a:t>
+            </a:r>
+            <a:endParaRPr lang="en-US" altLang="zh-CN" dirty="0"/>
+          </a:p>
+        </p:txBody>
+      </p:sp>
+    </p:spTree>
+    <p:extLst>
+      <p:ext uri="{BB962C8B-B14F-4D97-AF65-F5344CB8AC3E}">
+        <p14:creationId xmlns:p14="http://schemas.microsoft.com/office/powerpoint/2010/main" val="3792319055"/>
+      </p:ext>
+    </p:extLst>
+  </p:cSld>
+  <p:clrMapOvr>
+    <a:masterClrMapping/>
+  </p:clrMapOvr>
+</p:sld>
+</file>
+
+<file path=ppt/slides/slide11.xml><?xml version="1.0" encoding="utf-8"?>
+<p:sld xmlns:a="http://schemas.openxmlformats.org/drawingml/2006/main" xmlns:r="http://schemas.openxmlformats.org/officeDocument/2006/relationships" xmlns:p="http://schemas.openxmlformats.org/presentationml/2006/main">
+  <p:cSld>
+    <p:spTree>
+      <p:nvGrpSpPr>
+        <p:cNvPr id="1" name=""/>
+        <p:cNvGrpSpPr/>
+        <p:nvPr/>
+      </p:nvGrpSpPr>
+      <p:grpSpPr>
+        <a:xfrm>
+          <a:off x="0" y="0"/>
+          <a:ext cx="0" cy="0"/>
+          <a:chOff x="0" y="0"/>
+          <a:chExt cx="0" cy="0"/>
+        </a:xfrm>
+      </p:grpSpPr>
+      <p:sp>
+        <p:nvSpPr>
+          <p:cNvPr id="2" name="标题 1">
+            <a:extLst>
+              <a:ext uri="{FF2B5EF4-FFF2-40B4-BE49-F238E27FC236}">
                 <a16:creationId xmlns:a16="http://schemas.microsoft.com/office/drawing/2014/main" id="{7E4CFA14-E8C9-4F79-B31E-7AC8C0F7ADF4}"/>
               </a:ext>
             </a:extLst>
@@ -4388,7 +4517,7 @@
 </p:sld>
 </file>
 
-<file path=ppt/slides/slide11.xml><?xml version="1.0" encoding="utf-8"?>
+<file path=ppt/slides/slide12.xml><?xml version="1.0" encoding="utf-8"?>
 <p:sld xmlns:a="http://schemas.openxmlformats.org/drawingml/2006/main" xmlns:r="http://schemas.openxmlformats.org/officeDocument/2006/relationships" xmlns:p="http://schemas.openxmlformats.org/presentationml/2006/main">
   <p:cSld>
     <p:spTree>
@@ -4752,38 +4881,6 @@
             </a:r>
           </a:p>
           <a:p>
-            <a:r>
-              <a:rPr lang="en-US" altLang="zh-CN" dirty="0"/>
-              <a:t>Test</a:t>
-            </a:r>
-          </a:p>
-          <a:p>
-            <a:pPr lvl="1"/>
-            <a:r>
-              <a:rPr lang="en-US" altLang="zh-CN" dirty="0"/>
-              <a:t>One epoch of running MNIST(10000 sample subset)</a:t>
-            </a:r>
-            <a:r>
-              <a:rPr lang="zh-CN" altLang="en-US"/>
-              <a:t> </a:t>
-            </a:r>
-            <a:r>
-              <a:rPr lang="en-US" altLang="zh-CN"/>
-              <a:t>on </a:t>
-            </a:r>
-            <a:r>
-              <a:rPr lang="en-US" altLang="zh-CN" dirty="0"/>
-              <a:t>our residual network takes 200 s on my machine and takes 680s on one K80</a:t>
-            </a:r>
-          </a:p>
-          <a:p>
-            <a:pPr lvl="1"/>
-            <a:r>
-              <a:rPr lang="en-US" altLang="zh-CN" dirty="0"/>
-              <a:t>https://azure.microsoft.com/en-us/pricing/details/virtual-machines/linux/</a:t>
-            </a:r>
-          </a:p>
-          <a:p>
             <a:pPr marL="457200" lvl="1" indent="0">
               <a:buNone/>
             </a:pPr>
@@ -4829,7 +4926,7 @@
           <p:cNvPr id="2" name="标题 1">
             <a:extLst>
               <a:ext uri="{FF2B5EF4-FFF2-40B4-BE49-F238E27FC236}">
-                <a16:creationId xmlns:a16="http://schemas.microsoft.com/office/drawing/2014/main" id="{7E4CFA14-E8C9-4F79-B31E-7AC8C0F7ADF4}"/>
+                <a16:creationId xmlns:a16="http://schemas.microsoft.com/office/drawing/2014/main" id="{E7535784-DEBB-4CDB-8A0D-7251187CD83E}"/>
               </a:ext>
             </a:extLst>
           </p:cNvPr>
@@ -4847,7 +4944,7 @@
           <a:p>
             <a:r>
               <a:rPr lang="en-US" altLang="zh-CN" dirty="0"/>
-              <a:t>Data</a:t>
+              <a:t>Computation</a:t>
             </a:r>
             <a:endParaRPr lang="zh-CN" altLang="en-US" dirty="0"/>
           </a:p>
@@ -4858,7 +4955,7 @@
           <p:cNvPr id="3" name="内容占位符 2">
             <a:extLst>
               <a:ext uri="{FF2B5EF4-FFF2-40B4-BE49-F238E27FC236}">
-                <a16:creationId xmlns:a16="http://schemas.microsoft.com/office/drawing/2014/main" id="{65B773BF-8D7E-447B-99B4-F29841BEF59C}"/>
+                <a16:creationId xmlns:a16="http://schemas.microsoft.com/office/drawing/2014/main" id="{E0AE67E5-FED1-400F-B0D2-B8D1464FD31A}"/>
               </a:ext>
             </a:extLst>
           </p:cNvPr>
@@ -4876,63 +4973,44 @@
           <a:p>
             <a:r>
               <a:rPr lang="en-US" altLang="zh-CN" dirty="0"/>
-              <a:t>MNIST dataset</a:t>
+              <a:t>Test</a:t>
             </a:r>
           </a:p>
           <a:p>
             <a:pPr lvl="1"/>
             <a:r>
               <a:rPr lang="en-US" altLang="zh-CN" dirty="0"/>
-              <a:t>60000 handwritten 0-9 digits images for training, 10000 for test</a:t>
+              <a:t>One epoch of running MNIST(60000 samples)</a:t>
+            </a:r>
+            <a:r>
+              <a:rPr lang="zh-CN" altLang="en-US" dirty="0"/>
+              <a:t> </a:t>
+            </a:r>
+            <a:r>
+              <a:rPr lang="en-US" altLang="zh-CN" dirty="0"/>
+              <a:t>on our residual network takes 1000 s on my machine and takes more than 3000s on one K80, takes 2000s with two K80s, and takes </a:t>
+            </a:r>
+            <a:r>
+              <a:rPr lang="en-US" altLang="zh-CN"/>
+              <a:t>1000s with four </a:t>
+            </a:r>
+            <a:r>
+              <a:rPr lang="en-US" altLang="zh-CN" dirty="0"/>
+              <a:t>K80s</a:t>
             </a:r>
           </a:p>
           <a:p>
             <a:pPr lvl="1"/>
-            <a:r>
-              <a:rPr lang="en-US" altLang="zh-CN" dirty="0"/>
-              <a:t>Original shape 28x28, resized to 32x32</a:t>
-            </a:r>
-          </a:p>
-          <a:p>
-            <a:r>
-              <a:rPr lang="en-US" altLang="zh-CN" dirty="0"/>
-              <a:t>CIFAR10 dataset</a:t>
-            </a:r>
+            <a:endParaRPr lang="en-US" altLang="zh-CN" dirty="0"/>
           </a:p>
           <a:p>
             <a:pPr lvl="1"/>
             <a:r>
               <a:rPr lang="en-US" altLang="zh-CN" dirty="0"/>
-              <a:t>50000 natural images of 10 classes like airplane, automobile, cat, dog, </a:t>
-            </a:r>
-            <a:r>
-              <a:rPr lang="en-US" altLang="zh-CN" dirty="0" err="1"/>
-              <a:t>etc</a:t>
-            </a:r>
-            <a:r>
-              <a:rPr lang="en-US" altLang="zh-CN" dirty="0"/>
-              <a:t> for training, 10000 for test</a:t>
-            </a:r>
-          </a:p>
-          <a:p>
-            <a:pPr lvl="1"/>
-            <a:r>
-              <a:rPr lang="en-US" altLang="zh-CN" dirty="0"/>
-              <a:t>Original shape 32x32</a:t>
-            </a:r>
-          </a:p>
-          <a:p>
-            <a:r>
-              <a:rPr lang="en-US" altLang="zh-CN" dirty="0"/>
-              <a:t>Head Pose Image dataset</a:t>
-            </a:r>
-          </a:p>
-          <a:p>
-            <a:pPr lvl="1"/>
-            <a:r>
-              <a:rPr lang="en-US" altLang="zh-CN" dirty="0"/>
-              <a:t>http://www-prima.inrialpes.fr/perso/Gourier/Faces/HPDatabase.html</a:t>
-            </a:r>
+              <a:t>https://azure.microsoft.com/en-us/pricing/details/virtual-machines/linux/</a:t>
+            </a:r>
+          </a:p>
+          <a:p>
             <a:endParaRPr lang="zh-CN" altLang="en-US" dirty="0"/>
           </a:p>
         </p:txBody>
@@ -4940,7 +5018,7 @@
     </p:spTree>
     <p:extLst>
       <p:ext uri="{BB962C8B-B14F-4D97-AF65-F5344CB8AC3E}">
-        <p14:creationId xmlns:p14="http://schemas.microsoft.com/office/powerpoint/2010/main" val="996506143"/>
+        <p14:creationId xmlns:p14="http://schemas.microsoft.com/office/powerpoint/2010/main" val="505258949"/>
       </p:ext>
     </p:extLst>
   </p:cSld>
@@ -4990,11 +5068,8 @@
           <a:p>
             <a:r>
               <a:rPr lang="en-US" altLang="zh-CN" dirty="0"/>
-              <a:t>Compression and Classification</a:t>
-            </a:r>
-            <a:br>
-              <a:rPr lang="en-US" altLang="zh-CN" dirty="0"/>
-            </a:br>
+              <a:t>Data</a:t>
+            </a:r>
             <a:endParaRPr lang="zh-CN" altLang="en-US" dirty="0"/>
           </a:p>
         </p:txBody>
@@ -5022,94 +5097,71 @@
           <a:p>
             <a:r>
               <a:rPr lang="en-US" altLang="zh-CN" dirty="0"/>
-              <a:t>Milestones</a:t>
+              <a:t>MNIST dataset</a:t>
             </a:r>
           </a:p>
           <a:p>
             <a:pPr lvl="1"/>
             <a:r>
-              <a:rPr lang="en-US" altLang="zh-CN" dirty="0">
-                <a:solidFill>
-                  <a:srgbClr val="FF0000"/>
-                </a:solidFill>
-              </a:rPr>
-              <a:t>Classification part is not rate variable</a:t>
+              <a:rPr lang="en-US" altLang="zh-CN" dirty="0"/>
+              <a:t>60000 handwritten 0-9 digits images for training, 10000 for test</a:t>
             </a:r>
           </a:p>
           <a:p>
             <a:pPr lvl="1"/>
             <a:r>
               <a:rPr lang="en-US" altLang="zh-CN" dirty="0"/>
-              <a:t>Tuning parameter for multi-objective optimization or </a:t>
-            </a:r>
-            <a:r>
-              <a:rPr lang="en-US" altLang="zh-CN" dirty="0">
-                <a:solidFill>
-                  <a:srgbClr val="FFC000"/>
-                </a:solidFill>
-              </a:rPr>
-              <a:t>two stage (isolated) optimization</a:t>
+              <a:t>Original shape 28x28, resized to 32x32</a:t>
+            </a:r>
+          </a:p>
+          <a:p>
+            <a:r>
+              <a:rPr lang="en-US" altLang="zh-CN" dirty="0"/>
+              <a:t>CIFAR10 dataset</a:t>
             </a:r>
           </a:p>
           <a:p>
             <a:pPr lvl="1"/>
             <a:r>
-              <a:rPr lang="en-US" altLang="zh-CN" dirty="0">
-                <a:solidFill>
-                  <a:srgbClr val="FF0000"/>
-                </a:solidFill>
-              </a:rPr>
-              <a:t>More complex </a:t>
-            </a:r>
-            <a:r>
-              <a:rPr lang="en-US" altLang="zh-CN" dirty="0" err="1">
-                <a:solidFill>
-                  <a:srgbClr val="FF0000"/>
-                </a:solidFill>
-              </a:rPr>
-              <a:t>iid</a:t>
-            </a:r>
-            <a:r>
-              <a:rPr lang="en-US" altLang="zh-CN" dirty="0">
-                <a:solidFill>
-                  <a:srgbClr val="FF0000"/>
-                </a:solidFill>
-              </a:rPr>
-              <a:t> image data, like CIFAR10, </a:t>
-            </a:r>
-            <a:r>
-              <a:rPr lang="en-US" altLang="zh-CN" dirty="0"/>
-              <a:t>ImageNet</a:t>
+              <a:rPr lang="en-US" altLang="zh-CN" dirty="0"/>
+              <a:t>50000 natural images of 10 classes like airplane, automobile, cat, dog, </a:t>
+            </a:r>
+            <a:r>
+              <a:rPr lang="en-US" altLang="zh-CN" dirty="0" err="1"/>
+              <a:t>etc</a:t>
+            </a:r>
+            <a:r>
+              <a:rPr lang="en-US" altLang="zh-CN" dirty="0"/>
+              <a:t> for training, 10000 for test</a:t>
             </a:r>
           </a:p>
           <a:p>
             <a:pPr lvl="1"/>
             <a:r>
-              <a:rPr lang="en-US" altLang="zh-CN" dirty="0">
-                <a:solidFill>
-                  <a:srgbClr val="FFC000"/>
-                </a:solidFill>
-              </a:rPr>
-              <a:t>Video data, and add LSTM for patch data?</a:t>
-            </a:r>
-            <a:r>
-              <a:rPr lang="en-US" altLang="zh-CN" dirty="0"/>
-              <a:t> for frame data?</a:t>
+              <a:rPr lang="en-US" altLang="zh-CN" dirty="0"/>
+              <a:t>Original shape 32x32</a:t>
+            </a:r>
+          </a:p>
+          <a:p>
+            <a:r>
+              <a:rPr lang="en-US" altLang="zh-CN" dirty="0"/>
+              <a:t>Head Pose Image dataset</a:t>
             </a:r>
           </a:p>
           <a:p>
             <a:pPr lvl="1"/>
             <a:r>
               <a:rPr lang="en-US" altLang="zh-CN" dirty="0"/>
-              <a:t>Web crawler for retrieving large volume of data to search for architecture and compressing images</a:t>
-            </a:r>
+              <a:t>http://www-prima.inrialpes.fr/perso/Gourier/Faces/HPDatabase.html</a:t>
+            </a:r>
+            <a:endParaRPr lang="zh-CN" altLang="en-US" dirty="0"/>
           </a:p>
         </p:txBody>
       </p:sp>
     </p:spTree>
     <p:extLst>
       <p:ext uri="{BB962C8B-B14F-4D97-AF65-F5344CB8AC3E}">
-        <p14:creationId xmlns:p14="http://schemas.microsoft.com/office/powerpoint/2010/main" val="3865998934"/>
+        <p14:creationId xmlns:p14="http://schemas.microsoft.com/office/powerpoint/2010/main" val="996506143"/>
       </p:ext>
     </p:extLst>
   </p:cSld>
@@ -5141,7 +5193,7 @@
           <p:cNvPr id="2" name="标题 1">
             <a:extLst>
               <a:ext uri="{FF2B5EF4-FFF2-40B4-BE49-F238E27FC236}">
-                <a16:creationId xmlns:a16="http://schemas.microsoft.com/office/drawing/2014/main" id="{7B2A1942-1BEC-40D2-9DC4-D7C87FB14784}"/>
+                <a16:creationId xmlns:a16="http://schemas.microsoft.com/office/drawing/2014/main" id="{7E4CFA14-E8C9-4F79-B31E-7AC8C0F7ADF4}"/>
               </a:ext>
             </a:extLst>
           </p:cNvPr>
@@ -5161,6 +5213,9 @@
               <a:rPr lang="en-US" altLang="zh-CN" dirty="0"/>
               <a:t>Compression and Classification</a:t>
             </a:r>
+            <a:br>
+              <a:rPr lang="en-US" altLang="zh-CN" dirty="0"/>
+            </a:br>
             <a:endParaRPr lang="zh-CN" altLang="en-US" dirty="0"/>
           </a:p>
         </p:txBody>
@@ -5170,7 +5225,7 @@
           <p:cNvPr id="3" name="内容占位符 2">
             <a:extLst>
               <a:ext uri="{FF2B5EF4-FFF2-40B4-BE49-F238E27FC236}">
-                <a16:creationId xmlns:a16="http://schemas.microsoft.com/office/drawing/2014/main" id="{BC65CE38-BA13-4505-BDCA-8479C11833B0}"/>
+                <a16:creationId xmlns:a16="http://schemas.microsoft.com/office/drawing/2014/main" id="{65B773BF-8D7E-447B-99B4-F29841BEF59C}"/>
               </a:ext>
             </a:extLst>
           </p:cNvPr>
@@ -5183,13 +5238,22 @@
         </p:nvSpPr>
         <p:spPr/>
         <p:txBody>
-          <a:bodyPr>
-            <a:normAutofit/>
-          </a:bodyPr>
-          <a:lstStyle/>
-          <a:p>
-            <a:r>
-              <a:rPr lang="en-US" altLang="zh-CN" dirty="0"/>
+          <a:bodyPr/>
+          <a:lstStyle/>
+          <a:p>
+            <a:r>
+              <a:rPr lang="en-US" altLang="zh-CN" dirty="0"/>
+              <a:t>Milestones</a:t>
+            </a:r>
+          </a:p>
+          <a:p>
+            <a:pPr lvl="1"/>
+            <a:r>
+              <a:rPr lang="en-US" altLang="zh-CN" dirty="0">
+                <a:solidFill>
+                  <a:srgbClr val="FF0000"/>
+                </a:solidFill>
+              </a:rPr>
               <a:t>Classification part is not rate variable</a:t>
             </a:r>
           </a:p>
@@ -5197,7 +5261,68 @@
             <a:pPr lvl="1"/>
             <a:r>
               <a:rPr lang="en-US" altLang="zh-CN" dirty="0"/>
-              <a:t>With pure LSTM based network, we can achieve rate variable classification</a:t>
+              <a:t>Tuning parameter for multi-objective optimization or </a:t>
+            </a:r>
+            <a:r>
+              <a:rPr lang="en-US" altLang="zh-CN" dirty="0">
+                <a:solidFill>
+                  <a:srgbClr val="FFC000"/>
+                </a:solidFill>
+              </a:rPr>
+              <a:t>two stage (isolated) optimization</a:t>
+            </a:r>
+          </a:p>
+          <a:p>
+            <a:pPr lvl="1"/>
+            <a:r>
+              <a:rPr lang="en-US" altLang="zh-CN" dirty="0">
+                <a:solidFill>
+                  <a:srgbClr val="FF0000"/>
+                </a:solidFill>
+              </a:rPr>
+              <a:t>More complex </a:t>
+            </a:r>
+            <a:r>
+              <a:rPr lang="en-US" altLang="zh-CN" dirty="0" err="1">
+                <a:solidFill>
+                  <a:srgbClr val="FF0000"/>
+                </a:solidFill>
+              </a:rPr>
+              <a:t>iid</a:t>
+            </a:r>
+            <a:r>
+              <a:rPr lang="en-US" altLang="zh-CN" dirty="0">
+                <a:solidFill>
+                  <a:srgbClr val="FF0000"/>
+                </a:solidFill>
+              </a:rPr>
+              <a:t> image data, like CIFAR10, </a:t>
+            </a:r>
+            <a:r>
+              <a:rPr lang="en-US" altLang="zh-CN" dirty="0"/>
+              <a:t>ImageNet</a:t>
+            </a:r>
+          </a:p>
+          <a:p>
+            <a:pPr lvl="1"/>
+            <a:r>
+              <a:rPr lang="en-US" altLang="zh-CN" dirty="0">
+                <a:solidFill>
+                  <a:srgbClr val="FFC000"/>
+                </a:solidFill>
+              </a:rPr>
+              <a:t>Add LSTM for patch data?</a:t>
+            </a:r>
+            <a:r>
+              <a:rPr lang="en-US" altLang="zh-CN" dirty="0"/>
+              <a:t> for frame data?</a:t>
+            </a:r>
+          </a:p>
+          <a:p>
+            <a:pPr lvl="1"/>
+            <a:r>
+              <a:rPr lang="en-US" altLang="zh-CN" dirty="0"/>
+              <a:t>Web crawler for retrieving large volume of data to search for architecture and compressing images</a:t>
             </a:r>
           </a:p>
         </p:txBody>
@@ -5205,7 +5330,7 @@
     </p:spTree>
     <p:extLst>
       <p:ext uri="{BB962C8B-B14F-4D97-AF65-F5344CB8AC3E}">
-        <p14:creationId xmlns:p14="http://schemas.microsoft.com/office/powerpoint/2010/main" val="445564549"/>
+        <p14:creationId xmlns:p14="http://schemas.microsoft.com/office/powerpoint/2010/main" val="3865998934"/>
       </p:ext>
     </p:extLst>
   </p:cSld>
@@ -5286,15 +5411,202 @@
           <a:p>
             <a:r>
               <a:rPr lang="en-US" altLang="zh-CN" dirty="0"/>
-              <a:t>Two stage (isolated) optimization</a:t>
-            </a:r>
-          </a:p>
-        </p:txBody>
-      </p:sp>
+              <a:t>Classification part is not rate variable</a:t>
+            </a:r>
+          </a:p>
+          <a:p>
+            <a:pPr lvl="1"/>
+            <a:r>
+              <a:rPr lang="en-US" altLang="zh-CN" dirty="0"/>
+              <a:t>With pure LSTM based network, we can achieve rate variable classification</a:t>
+            </a:r>
+          </a:p>
+        </p:txBody>
+      </p:sp>
+      <p:pic>
+        <p:nvPicPr>
+          <p:cNvPr id="4" name="图片 3">
+            <a:extLst>
+              <a:ext uri="{FF2B5EF4-FFF2-40B4-BE49-F238E27FC236}">
+                <a16:creationId xmlns:a16="http://schemas.microsoft.com/office/drawing/2014/main" id="{31686674-F7E6-4ECC-8813-5EA1CB4B66EB}"/>
+              </a:ext>
+            </a:extLst>
+          </p:cNvPr>
+          <p:cNvPicPr>
+            <a:picLocks noChangeAspect="1"/>
+          </p:cNvPicPr>
+          <p:nvPr/>
+        </p:nvPicPr>
+        <p:blipFill>
+          <a:blip r:embed="rId3">
+            <a:extLst>
+              <a:ext uri="{28A0092B-C50C-407E-A947-70E740481C1C}">
+                <a14:useLocalDpi xmlns:a14="http://schemas.microsoft.com/office/drawing/2010/main" val="0"/>
+              </a:ext>
+            </a:extLst>
+          </a:blip>
+          <a:stretch>
+            <a:fillRect/>
+          </a:stretch>
+        </p:blipFill>
+        <p:spPr>
+          <a:xfrm>
+            <a:off x="520959" y="3180184"/>
+            <a:ext cx="3002601" cy="2218871"/>
+          </a:xfrm>
+          <a:prstGeom prst="rect">
+            <a:avLst/>
+          </a:prstGeom>
+        </p:spPr>
+      </p:pic>
+      <p:sp>
+        <p:nvSpPr>
+          <p:cNvPr id="5" name="文本框 4">
+            <a:extLst>
+              <a:ext uri="{FF2B5EF4-FFF2-40B4-BE49-F238E27FC236}">
+                <a16:creationId xmlns:a16="http://schemas.microsoft.com/office/drawing/2014/main" id="{FFB02D71-2560-472E-BD02-7EE72C2A064F}"/>
+              </a:ext>
+            </a:extLst>
+          </p:cNvPr>
+          <p:cNvSpPr txBox="1"/>
+          <p:nvPr/>
+        </p:nvSpPr>
+        <p:spPr>
+          <a:xfrm>
+            <a:off x="1101638" y="5418677"/>
+            <a:ext cx="1841241" cy="369332"/>
+          </a:xfrm>
+          <a:prstGeom prst="rect">
+            <a:avLst/>
+          </a:prstGeom>
+          <a:noFill/>
+        </p:spPr>
+        <p:txBody>
+          <a:bodyPr wrap="square" rtlCol="0">
+            <a:spAutoFit/>
+          </a:bodyPr>
+          <a:lstStyle/>
+          <a:p>
+            <a:r>
+              <a:rPr lang="en-US" altLang="zh-CN" dirty="0"/>
+              <a:t>Last time results</a:t>
+            </a:r>
+            <a:endParaRPr lang="zh-CN" altLang="en-US" dirty="0"/>
+          </a:p>
+        </p:txBody>
+      </p:sp>
+      <p:sp>
+        <p:nvSpPr>
+          <p:cNvPr id="6" name="文本框 5">
+            <a:extLst>
+              <a:ext uri="{FF2B5EF4-FFF2-40B4-BE49-F238E27FC236}">
+                <a16:creationId xmlns:a16="http://schemas.microsoft.com/office/drawing/2014/main" id="{39A89B76-AD8E-4475-8542-A3E3FC245196}"/>
+              </a:ext>
+            </a:extLst>
+          </p:cNvPr>
+          <p:cNvSpPr txBox="1"/>
+          <p:nvPr/>
+        </p:nvSpPr>
+        <p:spPr>
+          <a:xfrm>
+            <a:off x="7113663" y="5353363"/>
+            <a:ext cx="1841241" cy="369332"/>
+          </a:xfrm>
+          <a:prstGeom prst="rect">
+            <a:avLst/>
+          </a:prstGeom>
+          <a:noFill/>
+        </p:spPr>
+        <p:txBody>
+          <a:bodyPr wrap="square" rtlCol="0">
+            <a:spAutoFit/>
+          </a:bodyPr>
+          <a:lstStyle/>
+          <a:p>
+            <a:r>
+              <a:rPr lang="en-US" altLang="zh-CN" dirty="0"/>
+              <a:t>Current results</a:t>
+            </a:r>
+            <a:endParaRPr lang="zh-CN" altLang="en-US" dirty="0"/>
+          </a:p>
+        </p:txBody>
+      </p:sp>
+      <p:pic>
+        <p:nvPicPr>
+          <p:cNvPr id="8" name="图片 7">
+            <a:extLst>
+              <a:ext uri="{FF2B5EF4-FFF2-40B4-BE49-F238E27FC236}">
+                <a16:creationId xmlns:a16="http://schemas.microsoft.com/office/drawing/2014/main" id="{0FA0A468-4306-4924-AD43-4BC88F6BE5A3}"/>
+              </a:ext>
+            </a:extLst>
+          </p:cNvPr>
+          <p:cNvPicPr>
+            <a:picLocks noChangeAspect="1"/>
+          </p:cNvPicPr>
+          <p:nvPr/>
+        </p:nvPicPr>
+        <p:blipFill>
+          <a:blip r:embed="rId4">
+            <a:extLst>
+              <a:ext uri="{28A0092B-C50C-407E-A947-70E740481C1C}">
+                <a14:useLocalDpi xmlns:a14="http://schemas.microsoft.com/office/drawing/2010/main" val="0"/>
+              </a:ext>
+            </a:extLst>
+          </a:blip>
+          <a:stretch>
+            <a:fillRect/>
+          </a:stretch>
+        </p:blipFill>
+        <p:spPr>
+          <a:xfrm>
+            <a:off x="4714767" y="3046302"/>
+            <a:ext cx="3152483" cy="2352753"/>
+          </a:xfrm>
+          <a:prstGeom prst="rect">
+            <a:avLst/>
+          </a:prstGeom>
+        </p:spPr>
+      </p:pic>
+      <p:pic>
+        <p:nvPicPr>
+          <p:cNvPr id="10" name="图片 9">
+            <a:extLst>
+              <a:ext uri="{FF2B5EF4-FFF2-40B4-BE49-F238E27FC236}">
+                <a16:creationId xmlns:a16="http://schemas.microsoft.com/office/drawing/2014/main" id="{B17C7962-2667-4CCF-B578-AF133725F953}"/>
+              </a:ext>
+            </a:extLst>
+          </p:cNvPr>
+          <p:cNvPicPr>
+            <a:picLocks noChangeAspect="1"/>
+          </p:cNvPicPr>
+          <p:nvPr/>
+        </p:nvPicPr>
+        <p:blipFill>
+          <a:blip r:embed="rId5">
+            <a:extLst>
+              <a:ext uri="{28A0092B-C50C-407E-A947-70E740481C1C}">
+                <a14:useLocalDpi xmlns:a14="http://schemas.microsoft.com/office/drawing/2010/main" val="0"/>
+              </a:ext>
+            </a:extLst>
+          </a:blip>
+          <a:stretch>
+            <a:fillRect/>
+          </a:stretch>
+        </p:blipFill>
+        <p:spPr>
+          <a:xfrm>
+            <a:off x="8082503" y="3180183"/>
+            <a:ext cx="2980497" cy="2218871"/>
+          </a:xfrm>
+          <a:prstGeom prst="rect">
+            <a:avLst/>
+          </a:prstGeom>
+        </p:spPr>
+      </p:pic>
     </p:spTree>
     <p:extLst>
       <p:ext uri="{BB962C8B-B14F-4D97-AF65-F5344CB8AC3E}">
-        <p14:creationId xmlns:p14="http://schemas.microsoft.com/office/powerpoint/2010/main" val="2990382200"/>
+        <p14:creationId xmlns:p14="http://schemas.microsoft.com/office/powerpoint/2010/main" val="445564549"/>
       </p:ext>
     </p:extLst>
   </p:cSld>
@@ -5375,16 +5687,15 @@
           <a:p>
             <a:r>
               <a:rPr lang="en-US" altLang="zh-CN" dirty="0"/>
-              <a:t>CIFAR10</a:t>
-            </a:r>
-            <a:endParaRPr lang="zh-CN" altLang="en-US" dirty="0"/>
+              <a:t>Two stage (isolated) optimization</a:t>
+            </a:r>
           </a:p>
         </p:txBody>
       </p:sp>
     </p:spTree>
     <p:extLst>
       <p:ext uri="{BB962C8B-B14F-4D97-AF65-F5344CB8AC3E}">
-        <p14:creationId xmlns:p14="http://schemas.microsoft.com/office/powerpoint/2010/main" val="802639922"/>
+        <p14:creationId xmlns:p14="http://schemas.microsoft.com/office/powerpoint/2010/main" val="2990382200"/>
       </p:ext>
     </p:extLst>
   </p:cSld>
@@ -5465,54 +5776,16 @@
           <a:p>
             <a:r>
               <a:rPr lang="en-US" altLang="zh-CN" dirty="0"/>
-              <a:t>Patched LSTM</a:t>
-            </a:r>
-          </a:p>
-          <a:p>
-            <a:pPr lvl="1"/>
-            <a:r>
-              <a:rPr lang="en-US" altLang="zh-CN" dirty="0"/>
-              <a:t>Pad and </a:t>
-            </a:r>
-            <a:r>
-              <a:rPr lang="en-US" altLang="zh-CN" dirty="0" err="1"/>
-              <a:t>unpad</a:t>
-            </a:r>
-            <a:r>
-              <a:rPr lang="en-US" altLang="zh-CN" dirty="0"/>
-              <a:t> different size of images (sequence), otherwise we can only use </a:t>
-            </a:r>
-            <a:r>
-              <a:rPr lang="en-US" altLang="zh-CN" dirty="0" err="1"/>
-              <a:t>batch_size</a:t>
-            </a:r>
-            <a:r>
-              <a:rPr lang="en-US" altLang="zh-CN" dirty="0"/>
-              <a:t> = 1</a:t>
-            </a:r>
-          </a:p>
-          <a:p>
-            <a:pPr lvl="1"/>
-            <a:r>
-              <a:rPr lang="en-US" altLang="zh-CN"/>
-              <a:t>(Variable rate) </a:t>
-            </a:r>
-            <a:r>
-              <a:rPr lang="en-US" altLang="zh-CN" dirty="0"/>
-              <a:t>classification for non-uniform sizes </a:t>
-            </a:r>
-            <a:r>
-              <a:rPr lang="en-US" altLang="zh-CN"/>
-              <a:t>of images</a:t>
-            </a:r>
-            <a:endParaRPr lang="en-US" altLang="zh-CN" dirty="0"/>
+              <a:t>CIFAR10</a:t>
+            </a:r>
+            <a:endParaRPr lang="zh-CN" altLang="en-US" dirty="0"/>
           </a:p>
         </p:txBody>
       </p:sp>
     </p:spTree>
     <p:extLst>
       <p:ext uri="{BB962C8B-B14F-4D97-AF65-F5344CB8AC3E}">
-        <p14:creationId xmlns:p14="http://schemas.microsoft.com/office/powerpoint/2010/main" val="3792319055"/>
+        <p14:creationId xmlns:p14="http://schemas.microsoft.com/office/powerpoint/2010/main" val="802639922"/>
       </p:ext>
     </p:extLst>
   </p:cSld>

</xml_diff>

<commit_message>
update report and ONR
</commit_message>
<xml_diff>
--- a/doc/Report/ongoing.pptx
+++ b/doc/Report/ongoing.pptx
@@ -15,8 +15,8 @@
     <p:sldId id="296" r:id="rId6"/>
     <p:sldId id="302" r:id="rId7"/>
     <p:sldId id="309" r:id="rId8"/>
-    <p:sldId id="306" r:id="rId9"/>
-    <p:sldId id="307" r:id="rId10"/>
+    <p:sldId id="312" r:id="rId9"/>
+    <p:sldId id="306" r:id="rId10"/>
     <p:sldId id="310" r:id="rId11"/>
     <p:sldId id="304" r:id="rId12"/>
     <p:sldId id="305" r:id="rId13"/>
@@ -208,7 +208,7 @@
           <a:p>
             <a:fld id="{97BE2177-E45B-449F-AE2E-ED4743253C6D}" type="datetimeFigureOut">
               <a:rPr lang="zh-CN" altLang="en-US" smtClean="0"/>
-              <a:t>2018/9/9</a:t>
+              <a:t>2018/9/10</a:t>
             </a:fld>
             <a:endParaRPr lang="zh-CN" altLang="en-US"/>
           </a:p>
@@ -717,7 +717,7 @@
     </p:spTree>
     <p:extLst>
       <p:ext uri="{BB962C8B-B14F-4D97-AF65-F5344CB8AC3E}">
-        <p14:creationId xmlns:p14="http://schemas.microsoft.com/office/powerpoint/2010/main" val="2768591612"/>
+        <p14:creationId xmlns:p14="http://schemas.microsoft.com/office/powerpoint/2010/main" val="2947211378"/>
       </p:ext>
     </p:extLst>
   </p:cSld>
@@ -801,7 +801,7 @@
     </p:spTree>
     <p:extLst>
       <p:ext uri="{BB962C8B-B14F-4D97-AF65-F5344CB8AC3E}">
-        <p14:creationId xmlns:p14="http://schemas.microsoft.com/office/powerpoint/2010/main" val="1859630201"/>
+        <p14:creationId xmlns:p14="http://schemas.microsoft.com/office/powerpoint/2010/main" val="2768591612"/>
       </p:ext>
     </p:extLst>
   </p:cSld>
@@ -1042,7 +1042,7 @@
           <a:p>
             <a:fld id="{B9614994-C529-43AC-BD2C-52D47B0301A5}" type="datetimeFigureOut">
               <a:rPr lang="zh-CN" altLang="en-US" smtClean="0"/>
-              <a:t>2018/9/9</a:t>
+              <a:t>2018/9/10</a:t>
             </a:fld>
             <a:endParaRPr lang="zh-CN" altLang="en-US"/>
           </a:p>
@@ -1240,7 +1240,7 @@
           <a:p>
             <a:fld id="{B9614994-C529-43AC-BD2C-52D47B0301A5}" type="datetimeFigureOut">
               <a:rPr lang="zh-CN" altLang="en-US" smtClean="0"/>
-              <a:t>2018/9/9</a:t>
+              <a:t>2018/9/10</a:t>
             </a:fld>
             <a:endParaRPr lang="zh-CN" altLang="en-US"/>
           </a:p>
@@ -1448,7 +1448,7 @@
           <a:p>
             <a:fld id="{B9614994-C529-43AC-BD2C-52D47B0301A5}" type="datetimeFigureOut">
               <a:rPr lang="zh-CN" altLang="en-US" smtClean="0"/>
-              <a:t>2018/9/9</a:t>
+              <a:t>2018/9/10</a:t>
             </a:fld>
             <a:endParaRPr lang="zh-CN" altLang="en-US"/>
           </a:p>
@@ -1646,7 +1646,7 @@
           <a:p>
             <a:fld id="{B9614994-C529-43AC-BD2C-52D47B0301A5}" type="datetimeFigureOut">
               <a:rPr lang="zh-CN" altLang="en-US" smtClean="0"/>
-              <a:t>2018/9/9</a:t>
+              <a:t>2018/9/10</a:t>
             </a:fld>
             <a:endParaRPr lang="zh-CN" altLang="en-US"/>
           </a:p>
@@ -1921,7 +1921,7 @@
           <a:p>
             <a:fld id="{B9614994-C529-43AC-BD2C-52D47B0301A5}" type="datetimeFigureOut">
               <a:rPr lang="zh-CN" altLang="en-US" smtClean="0"/>
-              <a:t>2018/9/9</a:t>
+              <a:t>2018/9/10</a:t>
             </a:fld>
             <a:endParaRPr lang="zh-CN" altLang="en-US"/>
           </a:p>
@@ -2186,7 +2186,7 @@
           <a:p>
             <a:fld id="{B9614994-C529-43AC-BD2C-52D47B0301A5}" type="datetimeFigureOut">
               <a:rPr lang="zh-CN" altLang="en-US" smtClean="0"/>
-              <a:t>2018/9/9</a:t>
+              <a:t>2018/9/10</a:t>
             </a:fld>
             <a:endParaRPr lang="zh-CN" altLang="en-US"/>
           </a:p>
@@ -2598,7 +2598,7 @@
           <a:p>
             <a:fld id="{B9614994-C529-43AC-BD2C-52D47B0301A5}" type="datetimeFigureOut">
               <a:rPr lang="zh-CN" altLang="en-US" smtClean="0"/>
-              <a:t>2018/9/9</a:t>
+              <a:t>2018/9/10</a:t>
             </a:fld>
             <a:endParaRPr lang="zh-CN" altLang="en-US"/>
           </a:p>
@@ -2739,7 +2739,7 @@
           <a:p>
             <a:fld id="{B9614994-C529-43AC-BD2C-52D47B0301A5}" type="datetimeFigureOut">
               <a:rPr lang="zh-CN" altLang="en-US" smtClean="0"/>
-              <a:t>2018/9/9</a:t>
+              <a:t>2018/9/10</a:t>
             </a:fld>
             <a:endParaRPr lang="zh-CN" altLang="en-US"/>
           </a:p>
@@ -2852,7 +2852,7 @@
           <a:p>
             <a:fld id="{B9614994-C529-43AC-BD2C-52D47B0301A5}" type="datetimeFigureOut">
               <a:rPr lang="zh-CN" altLang="en-US" smtClean="0"/>
-              <a:t>2018/9/9</a:t>
+              <a:t>2018/9/10</a:t>
             </a:fld>
             <a:endParaRPr lang="zh-CN" altLang="en-US"/>
           </a:p>
@@ -3163,7 +3163,7 @@
           <a:p>
             <a:fld id="{B9614994-C529-43AC-BD2C-52D47B0301A5}" type="datetimeFigureOut">
               <a:rPr lang="zh-CN" altLang="en-US" smtClean="0"/>
-              <a:t>2018/9/9</a:t>
+              <a:t>2018/9/10</a:t>
             </a:fld>
             <a:endParaRPr lang="zh-CN" altLang="en-US"/>
           </a:p>
@@ -3451,7 +3451,7 @@
           <a:p>
             <a:fld id="{B9614994-C529-43AC-BD2C-52D47B0301A5}" type="datetimeFigureOut">
               <a:rPr lang="zh-CN" altLang="en-US" smtClean="0"/>
-              <a:t>2018/9/9</a:t>
+              <a:t>2018/9/10</a:t>
             </a:fld>
             <a:endParaRPr lang="zh-CN" altLang="en-US"/>
           </a:p>
@@ -3692,7 +3692,7 @@
           <a:p>
             <a:fld id="{B9614994-C529-43AC-BD2C-52D47B0301A5}" type="datetimeFigureOut">
               <a:rPr lang="zh-CN" altLang="en-US" smtClean="0"/>
-              <a:t>2018/9/9</a:t>
+              <a:t>2018/9/10</a:t>
             </a:fld>
             <a:endParaRPr lang="zh-CN" altLang="en-US"/>
           </a:p>
@@ -4988,20 +4988,15 @@
             </a:r>
             <a:r>
               <a:rPr lang="en-US" altLang="zh-CN" dirty="0"/>
-              <a:t>on our residual network takes 1000 s on my machine and takes more than 3000s on one K80, takes 2000s with two K80s, and takes </a:t>
-            </a:r>
-            <a:r>
-              <a:rPr lang="en-US" altLang="zh-CN"/>
-              <a:t>1000s with four </a:t>
-            </a:r>
-            <a:r>
-              <a:rPr lang="en-US" altLang="zh-CN" dirty="0"/>
-              <a:t>K80s</a:t>
+              <a:t>on our residual network takes 1000 s on my machine and takes more than 3000s on one K80, takes 2000s with two K80s, and takes 1000s with four K80s</a:t>
             </a:r>
           </a:p>
           <a:p>
             <a:pPr lvl="1"/>
-            <a:endParaRPr lang="en-US" altLang="zh-CN" dirty="0"/>
+            <a:r>
+              <a:rPr lang="en-US" altLang="zh-CN" dirty="0"/>
+              <a:t>Takes 900s on one P100, and takes 430s on two P100s, and takes 270s on 4 P100s</a:t>
+            </a:r>
           </a:p>
           <a:p>
             <a:pPr lvl="1"/>
@@ -5411,7 +5406,7 @@
           <a:p>
             <a:r>
               <a:rPr lang="en-US" altLang="zh-CN" dirty="0"/>
-              <a:t>Classification part is not rate variable</a:t>
+              <a:t>Classification part is not rate variable (MNIST)</a:t>
             </a:r>
           </a:p>
           <a:p>
@@ -5509,7 +5504,7 @@
         </p:nvSpPr>
         <p:spPr>
           <a:xfrm>
-            <a:off x="7113663" y="5353363"/>
+            <a:off x="7161882" y="5418677"/>
             <a:ext cx="1841241" cy="369332"/>
           </a:xfrm>
           <a:prstGeom prst="rect">
@@ -5687,15 +5682,130 @@
           <a:p>
             <a:r>
               <a:rPr lang="en-US" altLang="zh-CN" dirty="0"/>
-              <a:t>Two stage (isolated) optimization</a:t>
-            </a:r>
+              <a:t>Classification part is not rate variable (CIFAR10)</a:t>
+            </a:r>
+          </a:p>
+          <a:p>
+            <a:pPr lvl="1"/>
+            <a:r>
+              <a:rPr lang="en-US" altLang="zh-CN" dirty="0"/>
+              <a:t>With pure LSTM based network, we can achieve rate variable classification</a:t>
+            </a:r>
+          </a:p>
+        </p:txBody>
+      </p:sp>
+      <p:pic>
+        <p:nvPicPr>
+          <p:cNvPr id="8" name="图片 7">
+            <a:extLst>
+              <a:ext uri="{FF2B5EF4-FFF2-40B4-BE49-F238E27FC236}">
+                <a16:creationId xmlns:a16="http://schemas.microsoft.com/office/drawing/2014/main" id="{0FA0A468-4306-4924-AD43-4BC88F6BE5A3}"/>
+              </a:ext>
+            </a:extLst>
+          </p:cNvPr>
+          <p:cNvPicPr>
+            <a:picLocks noChangeAspect="1"/>
+          </p:cNvPicPr>
+          <p:nvPr/>
+        </p:nvPicPr>
+        <p:blipFill>
+          <a:blip r:embed="rId3">
+            <a:extLst>
+              <a:ext uri="{28A0092B-C50C-407E-A947-70E740481C1C}">
+                <a14:useLocalDpi xmlns:a14="http://schemas.microsoft.com/office/drawing/2010/main" val="0"/>
+              </a:ext>
+            </a:extLst>
+          </a:blip>
+          <a:stretch>
+            <a:fillRect/>
+          </a:stretch>
+        </p:blipFill>
+        <p:spPr>
+          <a:xfrm>
+            <a:off x="2145738" y="3113241"/>
+            <a:ext cx="3152483" cy="2352753"/>
+          </a:xfrm>
+          <a:prstGeom prst="rect">
+            <a:avLst/>
+          </a:prstGeom>
+        </p:spPr>
+      </p:pic>
+      <p:pic>
+        <p:nvPicPr>
+          <p:cNvPr id="10" name="图片 9">
+            <a:extLst>
+              <a:ext uri="{FF2B5EF4-FFF2-40B4-BE49-F238E27FC236}">
+                <a16:creationId xmlns:a16="http://schemas.microsoft.com/office/drawing/2014/main" id="{B17C7962-2667-4CCF-B578-AF133725F953}"/>
+              </a:ext>
+            </a:extLst>
+          </p:cNvPr>
+          <p:cNvPicPr>
+            <a:picLocks noChangeAspect="1"/>
+          </p:cNvPicPr>
+          <p:nvPr/>
+        </p:nvPicPr>
+        <p:blipFill>
+          <a:blip r:embed="rId4">
+            <a:extLst>
+              <a:ext uri="{28A0092B-C50C-407E-A947-70E740481C1C}">
+                <a14:useLocalDpi xmlns:a14="http://schemas.microsoft.com/office/drawing/2010/main" val="0"/>
+              </a:ext>
+            </a:extLst>
+          </a:blip>
+          <a:stretch>
+            <a:fillRect/>
+          </a:stretch>
+        </p:blipFill>
+        <p:spPr>
+          <a:xfrm>
+            <a:off x="6893781" y="3222122"/>
+            <a:ext cx="2980497" cy="2218871"/>
+          </a:xfrm>
+          <a:prstGeom prst="rect">
+            <a:avLst/>
+          </a:prstGeom>
+        </p:spPr>
+      </p:pic>
+      <p:sp>
+        <p:nvSpPr>
+          <p:cNvPr id="9" name="文本框 8">
+            <a:extLst>
+              <a:ext uri="{FF2B5EF4-FFF2-40B4-BE49-F238E27FC236}">
+                <a16:creationId xmlns:a16="http://schemas.microsoft.com/office/drawing/2014/main" id="{5F6CE0B7-3065-4D04-83D3-13837BBD229E}"/>
+              </a:ext>
+            </a:extLst>
+          </p:cNvPr>
+          <p:cNvSpPr txBox="1"/>
+          <p:nvPr/>
+        </p:nvSpPr>
+        <p:spPr>
+          <a:xfrm>
+            <a:off x="5233556" y="5508462"/>
+            <a:ext cx="1841241" cy="369332"/>
+          </a:xfrm>
+          <a:prstGeom prst="rect">
+            <a:avLst/>
+          </a:prstGeom>
+          <a:noFill/>
+        </p:spPr>
+        <p:txBody>
+          <a:bodyPr wrap="square" rtlCol="0">
+            <a:spAutoFit/>
+          </a:bodyPr>
+          <a:lstStyle/>
+          <a:p>
+            <a:r>
+              <a:rPr lang="en-US" altLang="zh-CN" dirty="0"/>
+              <a:t>Current results</a:t>
+            </a:r>
+            <a:endParaRPr lang="zh-CN" altLang="en-US" dirty="0"/>
           </a:p>
         </p:txBody>
       </p:sp>
     </p:spTree>
     <p:extLst>
       <p:ext uri="{BB962C8B-B14F-4D97-AF65-F5344CB8AC3E}">
-        <p14:creationId xmlns:p14="http://schemas.microsoft.com/office/powerpoint/2010/main" val="2990382200"/>
+        <p14:creationId xmlns:p14="http://schemas.microsoft.com/office/powerpoint/2010/main" val="1808278184"/>
       </p:ext>
     </p:extLst>
   </p:cSld>
@@ -5776,16 +5886,15 @@
           <a:p>
             <a:r>
               <a:rPr lang="en-US" altLang="zh-CN" dirty="0"/>
-              <a:t>CIFAR10</a:t>
-            </a:r>
-            <a:endParaRPr lang="zh-CN" altLang="en-US" dirty="0"/>
+              <a:t>Two stage (isolated) optimization</a:t>
+            </a:r>
           </a:p>
         </p:txBody>
       </p:sp>
     </p:spTree>
     <p:extLst>
       <p:ext uri="{BB962C8B-B14F-4D97-AF65-F5344CB8AC3E}">
-        <p14:creationId xmlns:p14="http://schemas.microsoft.com/office/powerpoint/2010/main" val="802639922"/>
+        <p14:creationId xmlns:p14="http://schemas.microsoft.com/office/powerpoint/2010/main" val="2990382200"/>
       </p:ext>
     </p:extLst>
   </p:cSld>

</xml_diff>